<commit_message>
update redgate powerpoint template with stats slide
</commit_message>
<xml_diff>
--- a/src/assets/brand/powerpoint/redgate-template.pptx
+++ b/src/assets/brand/powerpoint/redgate-template.pptx
@@ -5,16 +5,17 @@
     <p:sldMasterId id="2147483648" r:id="rId1"/>
   </p:sldMasterIdLst>
   <p:notesMasterIdLst>
-    <p:notesMasterId r:id="rId6"/>
+    <p:notesMasterId r:id="rId7"/>
   </p:notesMasterIdLst>
   <p:handoutMasterIdLst>
-    <p:handoutMasterId r:id="rId7"/>
+    <p:handoutMasterId r:id="rId8"/>
   </p:handoutMasterIdLst>
   <p:sldIdLst>
     <p:sldId id="337" r:id="rId2"/>
     <p:sldId id="339" r:id="rId3"/>
     <p:sldId id="340" r:id="rId4"/>
     <p:sldId id="338" r:id="rId5"/>
+    <p:sldId id="472" r:id="rId6"/>
   </p:sldIdLst>
   <p:sldSz cx="12192000" cy="6858000"/>
   <p:notesSz cx="6797675" cy="9926638"/>
@@ -145,7 +146,7 @@
   </p:defaultTextStyle>
   <p:extLst>
     <p:ext uri="{EFAFB233-063F-42B5-8137-9DF3F51BA10A}">
-      <p15:sldGuideLst xmlns="" xmlns:p15="http://schemas.microsoft.com/office/powerpoint/2012/main">
+      <p15:sldGuideLst xmlns:p15="http://schemas.microsoft.com/office/powerpoint/2012/main">
         <p15:guide id="1" orient="horz" pos="2160">
           <p15:clr>
             <a:srgbClr val="A4A3A4"/>
@@ -157,6 +158,20 @@
           </p15:clr>
         </p15:guide>
       </p15:sldGuideLst>
+    </p:ext>
+    <p:ext uri="{2D200454-40CA-4A62-9FC3-DE9A4176ACB9}">
+      <p15:notesGuideLst xmlns:p15="http://schemas.microsoft.com/office/powerpoint/2012/main">
+        <p15:guide id="1" orient="horz" pos="3126">
+          <p15:clr>
+            <a:srgbClr val="A4A3A4"/>
+          </p15:clr>
+        </p15:guide>
+        <p15:guide id="2" pos="2141">
+          <p15:clr>
+            <a:srgbClr val="A4A3A4"/>
+          </p15:clr>
+        </p15:guide>
+      </p15:notesGuideLst>
     </p:ext>
   </p:extLst>
 </p:presentation>
@@ -329,7 +344,7 @@
               <a:pPr>
                 <a:defRPr/>
               </a:pPr>
-              <a:t>30/06/16</a:t>
+              <a:t>3/4/2019</a:t>
             </a:fld>
             <a:endParaRPr lang="en-US" dirty="0"/>
           </a:p>
@@ -394,38 +409,37 @@
           <a:p>
             <a:pPr lvl="0"/>
             <a:r>
-              <a:rPr lang="en-US" noProof="0" smtClean="0"/>
+              <a:rPr lang="en-US" noProof="0"/>
               <a:t>Click to edit Master text styles</a:t>
             </a:r>
           </a:p>
           <a:p>
             <a:pPr lvl="1"/>
             <a:r>
-              <a:rPr lang="en-US" noProof="0" smtClean="0"/>
+              <a:rPr lang="en-US" noProof="0"/>
               <a:t>Second level</a:t>
             </a:r>
           </a:p>
           <a:p>
             <a:pPr lvl="2"/>
             <a:r>
-              <a:rPr lang="en-US" noProof="0" smtClean="0"/>
+              <a:rPr lang="en-US" noProof="0"/>
               <a:t>Third level</a:t>
             </a:r>
           </a:p>
           <a:p>
             <a:pPr lvl="3"/>
             <a:r>
-              <a:rPr lang="en-US" noProof="0" smtClean="0"/>
+              <a:rPr lang="en-US" noProof="0"/>
               <a:t>Fourth level</a:t>
             </a:r>
           </a:p>
           <a:p>
             <a:pPr lvl="4"/>
             <a:r>
-              <a:rPr lang="en-US" noProof="0" smtClean="0"/>
+              <a:rPr lang="en-US" noProof="0"/>
               <a:t>Fifth level</a:t>
             </a:r>
-            <a:endParaRPr lang="en-US" noProof="0"/>
           </a:p>
         </p:txBody>
       </p:sp>
@@ -586,6 +600,91 @@
 </p:notesMaster>
 </file>
 
+<file path=ppt/notesSlides/notesSlide1.xml><?xml version="1.0" encoding="utf-8"?>
+<p:notes xmlns:a="http://schemas.openxmlformats.org/drawingml/2006/main" xmlns:r="http://schemas.openxmlformats.org/officeDocument/2006/relationships" xmlns:p="http://schemas.openxmlformats.org/presentationml/2006/main">
+  <p:cSld>
+    <p:spTree>
+      <p:nvGrpSpPr>
+        <p:cNvPr id="1" name=""/>
+        <p:cNvGrpSpPr/>
+        <p:nvPr/>
+      </p:nvGrpSpPr>
+      <p:grpSpPr>
+        <a:xfrm>
+          <a:off x="0" y="0"/>
+          <a:ext cx="0" cy="0"/>
+          <a:chOff x="0" y="0"/>
+          <a:chExt cx="0" cy="0"/>
+        </a:xfrm>
+      </p:grpSpPr>
+      <p:sp>
+        <p:nvSpPr>
+          <p:cNvPr id="2" name="Slide Image Placeholder 1"/>
+          <p:cNvSpPr>
+            <a:spLocks noGrp="1" noRot="1" noChangeAspect="1"/>
+          </p:cNvSpPr>
+          <p:nvPr>
+            <p:ph type="sldImg"/>
+          </p:nvPr>
+        </p:nvSpPr>
+        <p:spPr/>
+      </p:sp>
+      <p:sp>
+        <p:nvSpPr>
+          <p:cNvPr id="3" name="Notes Placeholder 2"/>
+          <p:cNvSpPr>
+            <a:spLocks noGrp="1"/>
+          </p:cNvSpPr>
+          <p:nvPr>
+            <p:ph type="body" idx="1"/>
+          </p:nvPr>
+        </p:nvSpPr>
+        <p:spPr/>
+        <p:txBody>
+          <a:bodyPr/>
+          <a:lstStyle/>
+          <a:p>
+            <a:r>
+              <a:rPr lang="en-GB" dirty="0"/>
+              <a:t>Microsoft Gold partner</a:t>
+            </a:r>
+          </a:p>
+          <a:p>
+            <a:r>
+              <a:rPr lang="en-GB" dirty="0"/>
+              <a:t>4 Office locations across the US, UK and Australia</a:t>
+            </a:r>
+          </a:p>
+          <a:p>
+            <a:r>
+              <a:rPr lang="en-GB" dirty="0"/>
+              <a:t>Approaching 1 million customers</a:t>
+            </a:r>
+          </a:p>
+          <a:p>
+            <a:r>
+              <a:rPr lang="en-GB" dirty="0"/>
+              <a:t>Software used by very small organisations all the way up to large multinationals</a:t>
+            </a:r>
+          </a:p>
+          <a:p>
+            <a:endParaRPr lang="en-GB" dirty="0"/>
+          </a:p>
+        </p:txBody>
+      </p:sp>
+    </p:spTree>
+    <p:extLst>
+      <p:ext uri="{BB962C8B-B14F-4D97-AF65-F5344CB8AC3E}">
+        <p14:creationId xmlns:p14="http://schemas.microsoft.com/office/powerpoint/2010/main" val="3636758987"/>
+      </p:ext>
+    </p:extLst>
+  </p:cSld>
+  <p:clrMapOvr>
+    <a:masterClrMapping/>
+  </p:clrMapOvr>
+</p:notes>
+</file>
+
 <file path=ppt/slideLayouts/slideLayout1.xml><?xml version="1.0" encoding="utf-8"?>
 <p:sldLayout xmlns:a="http://schemas.openxmlformats.org/drawingml/2006/main" xmlns:r="http://schemas.openxmlformats.org/officeDocument/2006/relationships" xmlns:p="http://schemas.openxmlformats.org/presentationml/2006/main" type="title" preserve="1">
   <p:cSld name="Title Slide">
@@ -643,10 +742,9 @@
           </a:lstStyle>
           <a:p>
             <a:r>
-              <a:rPr lang="en-US" dirty="0" smtClean="0"/>
+              <a:rPr lang="en-US" dirty="0"/>
               <a:t>Click to edit Master title style</a:t>
             </a:r>
-            <a:endParaRPr lang="en-US" dirty="0"/>
           </a:p>
         </p:txBody>
       </p:sp>
@@ -714,10 +812,9 @@
           </a:lstStyle>
           <a:p>
             <a:r>
-              <a:rPr lang="en-US" dirty="0" smtClean="0"/>
+              <a:rPr lang="en-US" dirty="0"/>
               <a:t>Click to edit Master subtitle style</a:t>
             </a:r>
-            <a:endParaRPr lang="en-US" dirty="0"/>
           </a:p>
         </p:txBody>
       </p:sp>
@@ -915,10 +1012,9 @@
           </a:lstStyle>
           <a:p>
             <a:r>
-              <a:rPr lang="en-US" dirty="0" smtClean="0"/>
+              <a:rPr lang="en-US" dirty="0"/>
               <a:t>Click to edit Master title style</a:t>
             </a:r>
-            <a:endParaRPr lang="en-US" dirty="0"/>
           </a:p>
         </p:txBody>
       </p:sp>
@@ -977,21 +1073,21 @@
           <a:p>
             <a:pPr lvl="0"/>
             <a:r>
-              <a:rPr lang="en-US" dirty="0" smtClean="0"/>
+              <a:rPr lang="en-US" dirty="0"/>
               <a:t>Click to edit Master text styles</a:t>
             </a:r>
           </a:p>
           <a:p>
             <a:pPr lvl="1"/>
             <a:r>
-              <a:rPr lang="en-US" dirty="0" smtClean="0"/>
+              <a:rPr lang="en-US" dirty="0"/>
               <a:t>Second level</a:t>
             </a:r>
           </a:p>
           <a:p>
             <a:pPr lvl="2"/>
             <a:r>
-              <a:rPr lang="en-US" dirty="0" smtClean="0"/>
+              <a:rPr lang="en-US" dirty="0"/>
               <a:t>Third level</a:t>
             </a:r>
           </a:p>
@@ -1090,10 +1186,9 @@
           </a:lstStyle>
           <a:p>
             <a:r>
-              <a:rPr lang="en-US" dirty="0" smtClean="0"/>
+              <a:rPr lang="en-US" dirty="0"/>
               <a:t>Click to edit Master title style</a:t>
             </a:r>
-            <a:endParaRPr lang="en-US" dirty="0"/>
           </a:p>
         </p:txBody>
       </p:sp>
@@ -1157,7 +1252,7 @@
           <a:p>
             <a:pPr lvl="0"/>
             <a:r>
-              <a:rPr lang="en-US" dirty="0" smtClean="0"/>
+              <a:rPr lang="en-US" dirty="0"/>
               <a:t>Click to edit Master text styles</a:t>
             </a:r>
           </a:p>
@@ -1324,10 +1419,9 @@
           </a:lstStyle>
           <a:p>
             <a:r>
-              <a:rPr lang="en-US" dirty="0" smtClean="0"/>
+              <a:rPr lang="en-US" dirty="0"/>
               <a:t>Click to edit the image title</a:t>
             </a:r>
-            <a:endParaRPr lang="en-US" dirty="0"/>
           </a:p>
         </p:txBody>
       </p:sp>
@@ -1419,10 +1513,9 @@
           </a:lstStyle>
           <a:p>
             <a:r>
-              <a:rPr lang="en-US" dirty="0" smtClean="0"/>
+              <a:rPr lang="en-US" dirty="0"/>
               <a:t>“A very wise and interesting quote from someone great can go in this text box.”</a:t>
             </a:r>
-            <a:endParaRPr lang="en-US" dirty="0"/>
           </a:p>
         </p:txBody>
       </p:sp>
@@ -1490,10 +1583,9 @@
           </a:lstStyle>
           <a:p>
             <a:r>
-              <a:rPr lang="en-US" dirty="0" smtClean="0"/>
+              <a:rPr lang="en-US" dirty="0"/>
               <a:t>Pete Woodhouse</a:t>
             </a:r>
-            <a:endParaRPr lang="en-US" dirty="0"/>
           </a:p>
         </p:txBody>
       </p:sp>
@@ -1591,10 +1683,9 @@
           </a:lstStyle>
           <a:p>
             <a:r>
-              <a:rPr lang="en-US" dirty="0" smtClean="0"/>
+              <a:rPr lang="en-US" dirty="0"/>
               <a:t>This is a breaker page, it can be used to split topics</a:t>
             </a:r>
-            <a:endParaRPr lang="en-US" dirty="0"/>
           </a:p>
         </p:txBody>
       </p:sp>
@@ -1688,10 +1779,9 @@
           </a:lstStyle>
           <a:p>
             <a:r>
-              <a:rPr lang="en-US" dirty="0" smtClean="0"/>
+              <a:rPr lang="en-US" dirty="0"/>
               <a:t>“A very wise and interesting quote from someone great can go in this text box.”</a:t>
             </a:r>
-            <a:endParaRPr lang="en-US" dirty="0"/>
           </a:p>
         </p:txBody>
       </p:sp>
@@ -1759,10 +1849,9 @@
           </a:lstStyle>
           <a:p>
             <a:r>
-              <a:rPr lang="en-US" dirty="0" smtClean="0"/>
+              <a:rPr lang="en-US" dirty="0"/>
               <a:t>Pete Woodhouse</a:t>
             </a:r>
-            <a:endParaRPr lang="en-US" dirty="0"/>
           </a:p>
         </p:txBody>
       </p:sp>
@@ -1852,14 +1941,14 @@
           </a:ln>
           <a:extLst>
             <a:ext uri="{909E8E84-426E-40dd-AFC4-6F175D3DCCD1}">
-              <a14:hiddenFill xmlns:a14="http://schemas.microsoft.com/office/drawing/2010/main">
+              <a14:hiddenFill xmlns:a14="http://schemas.microsoft.com/office/drawing/2010/main" xmlns="">
                 <a:solidFill>
                   <a:srgbClr val="FFFFFF"/>
                 </a:solidFill>
               </a14:hiddenFill>
             </a:ext>
             <a:ext uri="{91240B29-F687-4f45-9708-019B960494DF}">
-              <a14:hiddenLine xmlns:a14="http://schemas.microsoft.com/office/drawing/2010/main" w="9525">
+              <a14:hiddenLine xmlns:a14="http://schemas.microsoft.com/office/drawing/2010/main" xmlns="" w="9525">
                 <a:solidFill>
                   <a:srgbClr val="000000"/>
                 </a:solidFill>
@@ -1881,7 +1970,7 @@
           <a:p>
             <a:pPr lvl="0"/>
             <a:r>
-              <a:rPr lang="en-US" altLang="en-US" dirty="0" smtClean="0"/>
+              <a:rPr lang="en-US" altLang="en-US" dirty="0"/>
               <a:t>Click to edit Master title style</a:t>
             </a:r>
           </a:p>
@@ -1911,14 +2000,14 @@
           </a:ln>
           <a:extLst>
             <a:ext uri="{909E8E84-426E-40dd-AFC4-6F175D3DCCD1}">
-              <a14:hiddenFill xmlns:a14="http://schemas.microsoft.com/office/drawing/2010/main">
+              <a14:hiddenFill xmlns:a14="http://schemas.microsoft.com/office/drawing/2010/main" xmlns="">
                 <a:solidFill>
                   <a:srgbClr val="FFFFFF"/>
                 </a:solidFill>
               </a14:hiddenFill>
             </a:ext>
             <a:ext uri="{91240B29-F687-4f45-9708-019B960494DF}">
-              <a14:hiddenLine xmlns:a14="http://schemas.microsoft.com/office/drawing/2010/main" w="9525">
+              <a14:hiddenLine xmlns:a14="http://schemas.microsoft.com/office/drawing/2010/main" xmlns="" w="9525">
                 <a:solidFill>
                   <a:srgbClr val="000000"/>
                 </a:solidFill>
@@ -1940,21 +2029,21 @@
           <a:p>
             <a:pPr lvl="0"/>
             <a:r>
-              <a:rPr lang="en-US" altLang="en-US" dirty="0" smtClean="0"/>
+              <a:rPr lang="en-US" altLang="en-US" dirty="0"/>
               <a:t>Click to edit Master text styles</a:t>
             </a:r>
           </a:p>
           <a:p>
             <a:pPr lvl="1"/>
             <a:r>
-              <a:rPr lang="en-US" altLang="en-US" dirty="0" smtClean="0"/>
+              <a:rPr lang="en-US" altLang="en-US" dirty="0"/>
               <a:t>Second level</a:t>
             </a:r>
           </a:p>
           <a:p>
             <a:pPr lvl="2"/>
             <a:r>
-              <a:rPr lang="en-US" altLang="en-US" dirty="0" smtClean="0"/>
+              <a:rPr lang="en-US" altLang="en-US" dirty="0"/>
               <a:t>Third level</a:t>
             </a:r>
           </a:p>
@@ -2583,14 +2672,9 @@
           <a:lstStyle/>
           <a:p>
             <a:r>
-              <a:rPr lang="en-US" dirty="0" smtClean="0"/>
-              <a:t>The </a:t>
+              <a:rPr lang="en-US" dirty="0"/>
+              <a:t>The Redgate Powerpoint template</a:t>
             </a:r>
-            <a:r>
-              <a:rPr lang="en-US" dirty="0" smtClean="0"/>
-              <a:t>Redgate Powerpoint template</a:t>
-            </a:r>
-            <a:endParaRPr lang="en-US" dirty="0"/>
           </a:p>
         </p:txBody>
       </p:sp>
@@ -2610,10 +2694,9 @@
           <a:lstStyle/>
           <a:p>
             <a:r>
-              <a:rPr lang="en-US" dirty="0" smtClean="0"/>
+              <a:rPr lang="en-US" dirty="0"/>
               <a:t>By Honeycomb</a:t>
             </a:r>
-            <a:endParaRPr lang="en-US" dirty="0"/>
           </a:p>
         </p:txBody>
       </p:sp>
@@ -2621,6 +2704,3602 @@
     <p:extLst>
       <p:ext uri="{BB962C8B-B14F-4D97-AF65-F5344CB8AC3E}">
         <p14:creationId xmlns:p14="http://schemas.microsoft.com/office/powerpoint/2010/main" val="2033673674"/>
+      </p:ext>
+    </p:extLst>
+  </p:cSld>
+  <p:clrMapOvr>
+    <a:masterClrMapping/>
+  </p:clrMapOvr>
+</p:sld>
+</file>
+
+<file path=ppt/slides/slide5.xml><?xml version="1.0" encoding="utf-8"?>
+<p:sld xmlns:a="http://schemas.openxmlformats.org/drawingml/2006/main" xmlns:r="http://schemas.openxmlformats.org/officeDocument/2006/relationships" xmlns:p="http://schemas.openxmlformats.org/presentationml/2006/main">
+  <p:cSld>
+    <p:spTree>
+      <p:nvGrpSpPr>
+        <p:cNvPr id="1" name=""/>
+        <p:cNvGrpSpPr/>
+        <p:nvPr/>
+      </p:nvGrpSpPr>
+      <p:grpSpPr>
+        <a:xfrm>
+          <a:off x="0" y="0"/>
+          <a:ext cx="0" cy="0"/>
+          <a:chOff x="0" y="0"/>
+          <a:chExt cx="0" cy="0"/>
+        </a:xfrm>
+      </p:grpSpPr>
+      <p:sp>
+        <p:nvSpPr>
+          <p:cNvPr id="4" name="Subtitle 2">
+            <a:extLst>
+              <a:ext uri="{FF2B5EF4-FFF2-40B4-BE49-F238E27FC236}">
+                <a16:creationId xmlns:a16="http://schemas.microsoft.com/office/drawing/2014/main" id="{DC19449D-E429-4521-A0E2-9257002DE8DF}"/>
+              </a:ext>
+            </a:extLst>
+          </p:cNvPr>
+          <p:cNvSpPr txBox="1">
+            <a:spLocks/>
+          </p:cNvSpPr>
+          <p:nvPr/>
+        </p:nvSpPr>
+        <p:spPr bwMode="auto">
+          <a:xfrm>
+            <a:off x="1939742" y="2184091"/>
+            <a:ext cx="1010815" cy="749110"/>
+          </a:xfrm>
+          <a:prstGeom prst="rect">
+            <a:avLst/>
+          </a:prstGeom>
+          <a:noFill/>
+          <a:ln>
+            <a:noFill/>
+          </a:ln>
+          <a:extLst>
+            <a:ext uri="{909E8E84-426E-40dd-AFC4-6F175D3DCCD1}">
+              <a14:hiddenFill xmlns:a14="http://schemas.microsoft.com/office/drawing/2010/main" xmlns="">
+                <a:solidFill>
+                  <a:srgbClr val="FFFFFF"/>
+                </a:solidFill>
+              </a14:hiddenFill>
+            </a:ext>
+            <a:ext uri="{91240B29-F687-4f45-9708-019B960494DF}">
+              <a14:hiddenLine xmlns:a14="http://schemas.microsoft.com/office/drawing/2010/main" xmlns="" w="9525">
+                <a:solidFill>
+                  <a:srgbClr val="000000"/>
+                </a:solidFill>
+                <a:miter lim="800000"/>
+                <a:headEnd/>
+                <a:tailEnd/>
+              </a14:hiddenLine>
+            </a:ext>
+          </a:extLst>
+        </p:spPr>
+        <p:txBody>
+          <a:bodyPr vert="horz" wrap="square" lIns="91440" tIns="45720" rIns="91440" bIns="45720" numCol="1" anchor="t" anchorCtr="0" compatLnSpc="1">
+            <a:prstTxWarp prst="textNoShape">
+              <a:avLst/>
+            </a:prstTxWarp>
+            <a:noAutofit/>
+          </a:bodyPr>
+          <a:lstStyle>
+            <a:lvl1pPr marL="457200" indent="-457200" algn="l" rtl="0" fontAlgn="base">
+              <a:lnSpc>
+                <a:spcPct val="130000"/>
+              </a:lnSpc>
+              <a:spcBef>
+                <a:spcPts val="1000"/>
+              </a:spcBef>
+              <a:spcAft>
+                <a:spcPct val="0"/>
+              </a:spcAft>
+              <a:buClr>
+                <a:srgbClr val="CC0000"/>
+              </a:buClr>
+              <a:buSzPct val="100000"/>
+              <a:buFont typeface="Arial"/>
+              <a:buChar char="•"/>
+              <a:defRPr sz="3400" b="0" i="0" kern="1200">
+                <a:solidFill>
+                  <a:srgbClr val="636363"/>
+                </a:solidFill>
+                <a:latin typeface="Roboto Regular"/>
+                <a:ea typeface="+mn-ea"/>
+                <a:cs typeface="Roboto Regular"/>
+              </a:defRPr>
+            </a:lvl1pPr>
+            <a:lvl2pPr marL="914400" indent="-457200" algn="l" rtl="0" fontAlgn="base">
+              <a:lnSpc>
+                <a:spcPct val="130000"/>
+              </a:lnSpc>
+              <a:spcBef>
+                <a:spcPts val="500"/>
+              </a:spcBef>
+              <a:spcAft>
+                <a:spcPct val="0"/>
+              </a:spcAft>
+              <a:buClr>
+                <a:srgbClr val="CC0000"/>
+              </a:buClr>
+              <a:buSzPct val="100000"/>
+              <a:buFont typeface="Arial"/>
+              <a:buChar char="•"/>
+              <a:defRPr sz="2800" b="0" i="0" kern="1200">
+                <a:solidFill>
+                  <a:srgbClr val="636363"/>
+                </a:solidFill>
+                <a:latin typeface="Roboto Regular"/>
+                <a:ea typeface="+mn-ea"/>
+                <a:cs typeface="Roboto Regular"/>
+              </a:defRPr>
+            </a:lvl2pPr>
+            <a:lvl3pPr marL="1257300" indent="-342900" algn="l" rtl="0" fontAlgn="base">
+              <a:lnSpc>
+                <a:spcPct val="130000"/>
+              </a:lnSpc>
+              <a:spcBef>
+                <a:spcPts val="500"/>
+              </a:spcBef>
+              <a:spcAft>
+                <a:spcPct val="0"/>
+              </a:spcAft>
+              <a:buClr>
+                <a:srgbClr val="CC0000"/>
+              </a:buClr>
+              <a:buSzPct val="100000"/>
+              <a:buFont typeface="Arial"/>
+              <a:buChar char="•"/>
+              <a:defRPr sz="2400" b="0" i="0" kern="1200">
+                <a:solidFill>
+                  <a:srgbClr val="636363"/>
+                </a:solidFill>
+                <a:latin typeface="Roboto Regular"/>
+                <a:ea typeface="+mn-ea"/>
+                <a:cs typeface="Roboto Regular"/>
+              </a:defRPr>
+            </a:lvl3pPr>
+            <a:lvl4pPr marL="1600200" indent="-228600" algn="l" rtl="0" fontAlgn="base">
+              <a:lnSpc>
+                <a:spcPct val="120000"/>
+              </a:lnSpc>
+              <a:spcBef>
+                <a:spcPts val="500"/>
+              </a:spcBef>
+              <a:spcAft>
+                <a:spcPct val="0"/>
+              </a:spcAft>
+              <a:buFont typeface="Arial" panose="020B0604020202020204" pitchFamily="34" charset="0"/>
+              <a:buChar char="•"/>
+              <a:defRPr b="0" i="0" kern="1200">
+                <a:solidFill>
+                  <a:srgbClr val="191919"/>
+                </a:solidFill>
+                <a:latin typeface="Roboto Regular"/>
+                <a:ea typeface="+mn-ea"/>
+                <a:cs typeface="Roboto Regular"/>
+              </a:defRPr>
+            </a:lvl4pPr>
+            <a:lvl5pPr marL="2057400" indent="-228600" algn="l" rtl="0" fontAlgn="base">
+              <a:lnSpc>
+                <a:spcPct val="120000"/>
+              </a:lnSpc>
+              <a:spcBef>
+                <a:spcPts val="500"/>
+              </a:spcBef>
+              <a:spcAft>
+                <a:spcPct val="0"/>
+              </a:spcAft>
+              <a:buFont typeface="Arial" panose="020B0604020202020204" pitchFamily="34" charset="0"/>
+              <a:buChar char="•"/>
+              <a:defRPr b="0" i="0" kern="1200">
+                <a:solidFill>
+                  <a:srgbClr val="191919"/>
+                </a:solidFill>
+                <a:latin typeface="Roboto Regular"/>
+                <a:ea typeface="+mn-ea"/>
+                <a:cs typeface="Roboto Regular"/>
+              </a:defRPr>
+            </a:lvl5pPr>
+            <a:lvl6pPr marL="2514600" indent="-228600" algn="l" defTabSz="914400" rtl="0" eaLnBrk="1" latinLnBrk="0" hangingPunct="1">
+              <a:lnSpc>
+                <a:spcPct val="90000"/>
+              </a:lnSpc>
+              <a:spcBef>
+                <a:spcPts val="500"/>
+              </a:spcBef>
+              <a:buFont typeface="Arial" panose="020B0604020202020204" pitchFamily="34" charset="0"/>
+              <a:buChar char="•"/>
+              <a:defRPr sz="1800" kern="1200">
+                <a:solidFill>
+                  <a:schemeClr val="tx1"/>
+                </a:solidFill>
+                <a:latin typeface="+mn-lt"/>
+                <a:ea typeface="+mn-ea"/>
+                <a:cs typeface="+mn-cs"/>
+              </a:defRPr>
+            </a:lvl6pPr>
+            <a:lvl7pPr marL="2971800" indent="-228600" algn="l" defTabSz="914400" rtl="0" eaLnBrk="1" latinLnBrk="0" hangingPunct="1">
+              <a:lnSpc>
+                <a:spcPct val="90000"/>
+              </a:lnSpc>
+              <a:spcBef>
+                <a:spcPts val="500"/>
+              </a:spcBef>
+              <a:buFont typeface="Arial" panose="020B0604020202020204" pitchFamily="34" charset="0"/>
+              <a:buChar char="•"/>
+              <a:defRPr sz="1800" kern="1200">
+                <a:solidFill>
+                  <a:schemeClr val="tx1"/>
+                </a:solidFill>
+                <a:latin typeface="+mn-lt"/>
+                <a:ea typeface="+mn-ea"/>
+                <a:cs typeface="+mn-cs"/>
+              </a:defRPr>
+            </a:lvl7pPr>
+            <a:lvl8pPr marL="3429000" indent="-228600" algn="l" defTabSz="914400" rtl="0" eaLnBrk="1" latinLnBrk="0" hangingPunct="1">
+              <a:lnSpc>
+                <a:spcPct val="90000"/>
+              </a:lnSpc>
+              <a:spcBef>
+                <a:spcPts val="500"/>
+              </a:spcBef>
+              <a:buFont typeface="Arial" panose="020B0604020202020204" pitchFamily="34" charset="0"/>
+              <a:buChar char="•"/>
+              <a:defRPr sz="1800" kern="1200">
+                <a:solidFill>
+                  <a:schemeClr val="tx1"/>
+                </a:solidFill>
+                <a:latin typeface="+mn-lt"/>
+                <a:ea typeface="+mn-ea"/>
+                <a:cs typeface="+mn-cs"/>
+              </a:defRPr>
+            </a:lvl8pPr>
+            <a:lvl9pPr marL="3886200" indent="-228600" algn="l" defTabSz="914400" rtl="0" eaLnBrk="1" latinLnBrk="0" hangingPunct="1">
+              <a:lnSpc>
+                <a:spcPct val="90000"/>
+              </a:lnSpc>
+              <a:spcBef>
+                <a:spcPts val="500"/>
+              </a:spcBef>
+              <a:buFont typeface="Arial" panose="020B0604020202020204" pitchFamily="34" charset="0"/>
+              <a:buChar char="•"/>
+              <a:defRPr sz="1800" kern="1200">
+                <a:solidFill>
+                  <a:schemeClr val="tx1"/>
+                </a:solidFill>
+                <a:latin typeface="+mn-lt"/>
+                <a:ea typeface="+mn-ea"/>
+                <a:cs typeface="+mn-cs"/>
+              </a:defRPr>
+            </a:lvl9pPr>
+          </a:lstStyle>
+          <a:p>
+            <a:pPr marL="0" indent="0">
+              <a:buNone/>
+            </a:pPr>
+            <a:r>
+              <a:rPr lang="en-US" sz="3600" b="1" dirty="0">
+                <a:solidFill>
+                  <a:srgbClr val="CC0000"/>
+                </a:solidFill>
+                <a:latin typeface="Arial" charset="0"/>
+                <a:ea typeface="Arial" charset="0"/>
+                <a:cs typeface="Arial" charset="0"/>
+              </a:rPr>
+              <a:t>314</a:t>
+            </a:r>
+          </a:p>
+        </p:txBody>
+      </p:sp>
+      <p:sp>
+        <p:nvSpPr>
+          <p:cNvPr id="6" name="Subtitle 2">
+            <a:extLst>
+              <a:ext uri="{FF2B5EF4-FFF2-40B4-BE49-F238E27FC236}">
+                <a16:creationId xmlns:a16="http://schemas.microsoft.com/office/drawing/2014/main" id="{BDFEECAD-44EF-4E13-985D-88058287AB2F}"/>
+              </a:ext>
+            </a:extLst>
+          </p:cNvPr>
+          <p:cNvSpPr txBox="1">
+            <a:spLocks/>
+          </p:cNvSpPr>
+          <p:nvPr/>
+        </p:nvSpPr>
+        <p:spPr>
+          <a:xfrm>
+            <a:off x="1324172" y="2890577"/>
+            <a:ext cx="2147095" cy="505008"/>
+          </a:xfrm>
+          <a:prstGeom prst="rect">
+            <a:avLst/>
+          </a:prstGeom>
+        </p:spPr>
+        <p:txBody>
+          <a:bodyPr vert="horz" lIns="91440" tIns="45720" rIns="91440" bIns="45720" rtlCol="0">
+            <a:noAutofit/>
+          </a:bodyPr>
+          <a:lstStyle>
+            <a:lvl1pPr marL="0" indent="0" algn="ctr" defTabSz="914400" rtl="0" eaLnBrk="1" latinLnBrk="0" hangingPunct="1">
+              <a:lnSpc>
+                <a:spcPct val="90000"/>
+              </a:lnSpc>
+              <a:spcBef>
+                <a:spcPts val="1000"/>
+              </a:spcBef>
+              <a:buFont typeface="Arial"/>
+              <a:buNone/>
+              <a:defRPr sz="2400" kern="1200">
+                <a:solidFill>
+                  <a:schemeClr val="tx1"/>
+                </a:solidFill>
+                <a:latin typeface="+mn-lt"/>
+                <a:ea typeface="+mn-ea"/>
+                <a:cs typeface="+mn-cs"/>
+              </a:defRPr>
+            </a:lvl1pPr>
+            <a:lvl2pPr marL="457200" indent="0" algn="ctr" defTabSz="914400" rtl="0" eaLnBrk="1" latinLnBrk="0" hangingPunct="1">
+              <a:lnSpc>
+                <a:spcPct val="90000"/>
+              </a:lnSpc>
+              <a:spcBef>
+                <a:spcPts val="500"/>
+              </a:spcBef>
+              <a:buFont typeface="Arial"/>
+              <a:buNone/>
+              <a:defRPr sz="2000" kern="1200">
+                <a:solidFill>
+                  <a:schemeClr val="tx1"/>
+                </a:solidFill>
+                <a:latin typeface="+mn-lt"/>
+                <a:ea typeface="+mn-ea"/>
+                <a:cs typeface="+mn-cs"/>
+              </a:defRPr>
+            </a:lvl2pPr>
+            <a:lvl3pPr marL="914400" indent="0" algn="ctr" defTabSz="914400" rtl="0" eaLnBrk="1" latinLnBrk="0" hangingPunct="1">
+              <a:lnSpc>
+                <a:spcPct val="90000"/>
+              </a:lnSpc>
+              <a:spcBef>
+                <a:spcPts val="500"/>
+              </a:spcBef>
+              <a:buFont typeface="Arial"/>
+              <a:buNone/>
+              <a:defRPr sz="1800" kern="1200">
+                <a:solidFill>
+                  <a:schemeClr val="tx1"/>
+                </a:solidFill>
+                <a:latin typeface="+mn-lt"/>
+                <a:ea typeface="+mn-ea"/>
+                <a:cs typeface="+mn-cs"/>
+              </a:defRPr>
+            </a:lvl3pPr>
+            <a:lvl4pPr marL="1371600" indent="0" algn="ctr" defTabSz="914400" rtl="0" eaLnBrk="1" latinLnBrk="0" hangingPunct="1">
+              <a:lnSpc>
+                <a:spcPct val="90000"/>
+              </a:lnSpc>
+              <a:spcBef>
+                <a:spcPts val="500"/>
+              </a:spcBef>
+              <a:buFont typeface="Arial"/>
+              <a:buNone/>
+              <a:defRPr sz="1600" kern="1200">
+                <a:solidFill>
+                  <a:schemeClr val="tx1"/>
+                </a:solidFill>
+                <a:latin typeface="+mn-lt"/>
+                <a:ea typeface="+mn-ea"/>
+                <a:cs typeface="+mn-cs"/>
+              </a:defRPr>
+            </a:lvl4pPr>
+            <a:lvl5pPr marL="1828800" indent="0" algn="ctr" defTabSz="914400" rtl="0" eaLnBrk="1" latinLnBrk="0" hangingPunct="1">
+              <a:lnSpc>
+                <a:spcPct val="90000"/>
+              </a:lnSpc>
+              <a:spcBef>
+                <a:spcPts val="500"/>
+              </a:spcBef>
+              <a:buFont typeface="Arial"/>
+              <a:buNone/>
+              <a:defRPr sz="1600" kern="1200">
+                <a:solidFill>
+                  <a:schemeClr val="tx1"/>
+                </a:solidFill>
+                <a:latin typeface="+mn-lt"/>
+                <a:ea typeface="+mn-ea"/>
+                <a:cs typeface="+mn-cs"/>
+              </a:defRPr>
+            </a:lvl5pPr>
+            <a:lvl6pPr marL="2286000" indent="0" algn="ctr" defTabSz="914400" rtl="0" eaLnBrk="1" latinLnBrk="0" hangingPunct="1">
+              <a:lnSpc>
+                <a:spcPct val="90000"/>
+              </a:lnSpc>
+              <a:spcBef>
+                <a:spcPts val="500"/>
+              </a:spcBef>
+              <a:buFont typeface="Arial"/>
+              <a:buNone/>
+              <a:defRPr sz="1600" kern="1200">
+                <a:solidFill>
+                  <a:schemeClr val="tx1"/>
+                </a:solidFill>
+                <a:latin typeface="+mn-lt"/>
+                <a:ea typeface="+mn-ea"/>
+                <a:cs typeface="+mn-cs"/>
+              </a:defRPr>
+            </a:lvl6pPr>
+            <a:lvl7pPr marL="2743200" indent="0" algn="ctr" defTabSz="914400" rtl="0" eaLnBrk="1" latinLnBrk="0" hangingPunct="1">
+              <a:lnSpc>
+                <a:spcPct val="90000"/>
+              </a:lnSpc>
+              <a:spcBef>
+                <a:spcPts val="500"/>
+              </a:spcBef>
+              <a:buFont typeface="Arial"/>
+              <a:buNone/>
+              <a:defRPr sz="1600" kern="1200">
+                <a:solidFill>
+                  <a:schemeClr val="tx1"/>
+                </a:solidFill>
+                <a:latin typeface="+mn-lt"/>
+                <a:ea typeface="+mn-ea"/>
+                <a:cs typeface="+mn-cs"/>
+              </a:defRPr>
+            </a:lvl7pPr>
+            <a:lvl8pPr marL="3200400" indent="0" algn="ctr" defTabSz="914400" rtl="0" eaLnBrk="1" latinLnBrk="0" hangingPunct="1">
+              <a:lnSpc>
+                <a:spcPct val="90000"/>
+              </a:lnSpc>
+              <a:spcBef>
+                <a:spcPts val="500"/>
+              </a:spcBef>
+              <a:buFont typeface="Arial"/>
+              <a:buNone/>
+              <a:defRPr sz="1600" kern="1200">
+                <a:solidFill>
+                  <a:schemeClr val="tx1"/>
+                </a:solidFill>
+                <a:latin typeface="+mn-lt"/>
+                <a:ea typeface="+mn-ea"/>
+                <a:cs typeface="+mn-cs"/>
+              </a:defRPr>
+            </a:lvl8pPr>
+            <a:lvl9pPr marL="3657600" indent="0" algn="ctr" defTabSz="914400" rtl="0" eaLnBrk="1" latinLnBrk="0" hangingPunct="1">
+              <a:lnSpc>
+                <a:spcPct val="90000"/>
+              </a:lnSpc>
+              <a:spcBef>
+                <a:spcPts val="500"/>
+              </a:spcBef>
+              <a:buFont typeface="Arial"/>
+              <a:buNone/>
+              <a:defRPr sz="1600" kern="1200">
+                <a:solidFill>
+                  <a:schemeClr val="tx1"/>
+                </a:solidFill>
+                <a:latin typeface="+mn-lt"/>
+                <a:ea typeface="+mn-ea"/>
+                <a:cs typeface="+mn-cs"/>
+              </a:defRPr>
+            </a:lvl9pPr>
+          </a:lstStyle>
+          <a:p>
+            <a:r>
+              <a:rPr lang="en-US" sz="1400" err="1">
+                <a:latin typeface="Arial" charset="0"/>
+                <a:ea typeface="Arial" charset="0"/>
+                <a:cs typeface="Arial" charset="0"/>
+              </a:rPr>
+              <a:t>Redgaters</a:t>
+            </a:r>
+            <a:r>
+              <a:rPr lang="en-US" sz="1400">
+                <a:latin typeface="Arial" charset="0"/>
+                <a:ea typeface="Arial" charset="0"/>
+                <a:cs typeface="Arial" charset="0"/>
+              </a:rPr>
+              <a:t> and counting</a:t>
+            </a:r>
+          </a:p>
+        </p:txBody>
+      </p:sp>
+      <p:sp>
+        <p:nvSpPr>
+          <p:cNvPr id="8" name="Subtitle 2">
+            <a:extLst>
+              <a:ext uri="{FF2B5EF4-FFF2-40B4-BE49-F238E27FC236}">
+                <a16:creationId xmlns:a16="http://schemas.microsoft.com/office/drawing/2014/main" id="{850D463B-EFD9-4CC9-8D26-18D87EE49EBA}"/>
+              </a:ext>
+            </a:extLst>
+          </p:cNvPr>
+          <p:cNvSpPr txBox="1">
+            <a:spLocks/>
+          </p:cNvSpPr>
+          <p:nvPr/>
+        </p:nvSpPr>
+        <p:spPr>
+          <a:xfrm>
+            <a:off x="4151870" y="2323671"/>
+            <a:ext cx="1358685" cy="563113"/>
+          </a:xfrm>
+          <a:prstGeom prst="rect">
+            <a:avLst/>
+          </a:prstGeom>
+        </p:spPr>
+        <p:txBody>
+          <a:bodyPr vert="horz" lIns="91440" tIns="45720" rIns="91440" bIns="45720" rtlCol="0">
+            <a:noAutofit/>
+          </a:bodyPr>
+          <a:lstStyle>
+            <a:lvl1pPr marL="0" indent="0" algn="ctr" defTabSz="914400" rtl="0" eaLnBrk="1" latinLnBrk="0" hangingPunct="1">
+              <a:lnSpc>
+                <a:spcPct val="90000"/>
+              </a:lnSpc>
+              <a:spcBef>
+                <a:spcPts val="1000"/>
+              </a:spcBef>
+              <a:buFont typeface="Arial"/>
+              <a:buNone/>
+              <a:defRPr sz="2400" kern="1200">
+                <a:solidFill>
+                  <a:schemeClr val="tx1"/>
+                </a:solidFill>
+                <a:latin typeface="+mn-lt"/>
+                <a:ea typeface="+mn-ea"/>
+                <a:cs typeface="+mn-cs"/>
+              </a:defRPr>
+            </a:lvl1pPr>
+            <a:lvl2pPr marL="457200" indent="0" algn="ctr" defTabSz="914400" rtl="0" eaLnBrk="1" latinLnBrk="0" hangingPunct="1">
+              <a:lnSpc>
+                <a:spcPct val="90000"/>
+              </a:lnSpc>
+              <a:spcBef>
+                <a:spcPts val="500"/>
+              </a:spcBef>
+              <a:buFont typeface="Arial"/>
+              <a:buNone/>
+              <a:defRPr sz="2000" kern="1200">
+                <a:solidFill>
+                  <a:schemeClr val="tx1"/>
+                </a:solidFill>
+                <a:latin typeface="+mn-lt"/>
+                <a:ea typeface="+mn-ea"/>
+                <a:cs typeface="+mn-cs"/>
+              </a:defRPr>
+            </a:lvl2pPr>
+            <a:lvl3pPr marL="914400" indent="0" algn="ctr" defTabSz="914400" rtl="0" eaLnBrk="1" latinLnBrk="0" hangingPunct="1">
+              <a:lnSpc>
+                <a:spcPct val="90000"/>
+              </a:lnSpc>
+              <a:spcBef>
+                <a:spcPts val="500"/>
+              </a:spcBef>
+              <a:buFont typeface="Arial"/>
+              <a:buNone/>
+              <a:defRPr sz="1800" kern="1200">
+                <a:solidFill>
+                  <a:schemeClr val="tx1"/>
+                </a:solidFill>
+                <a:latin typeface="+mn-lt"/>
+                <a:ea typeface="+mn-ea"/>
+                <a:cs typeface="+mn-cs"/>
+              </a:defRPr>
+            </a:lvl3pPr>
+            <a:lvl4pPr marL="1371600" indent="0" algn="ctr" defTabSz="914400" rtl="0" eaLnBrk="1" latinLnBrk="0" hangingPunct="1">
+              <a:lnSpc>
+                <a:spcPct val="90000"/>
+              </a:lnSpc>
+              <a:spcBef>
+                <a:spcPts val="500"/>
+              </a:spcBef>
+              <a:buFont typeface="Arial"/>
+              <a:buNone/>
+              <a:defRPr sz="1600" kern="1200">
+                <a:solidFill>
+                  <a:schemeClr val="tx1"/>
+                </a:solidFill>
+                <a:latin typeface="+mn-lt"/>
+                <a:ea typeface="+mn-ea"/>
+                <a:cs typeface="+mn-cs"/>
+              </a:defRPr>
+            </a:lvl4pPr>
+            <a:lvl5pPr marL="1828800" indent="0" algn="ctr" defTabSz="914400" rtl="0" eaLnBrk="1" latinLnBrk="0" hangingPunct="1">
+              <a:lnSpc>
+                <a:spcPct val="90000"/>
+              </a:lnSpc>
+              <a:spcBef>
+                <a:spcPts val="500"/>
+              </a:spcBef>
+              <a:buFont typeface="Arial"/>
+              <a:buNone/>
+              <a:defRPr sz="1600" kern="1200">
+                <a:solidFill>
+                  <a:schemeClr val="tx1"/>
+                </a:solidFill>
+                <a:latin typeface="+mn-lt"/>
+                <a:ea typeface="+mn-ea"/>
+                <a:cs typeface="+mn-cs"/>
+              </a:defRPr>
+            </a:lvl5pPr>
+            <a:lvl6pPr marL="2286000" indent="0" algn="ctr" defTabSz="914400" rtl="0" eaLnBrk="1" latinLnBrk="0" hangingPunct="1">
+              <a:lnSpc>
+                <a:spcPct val="90000"/>
+              </a:lnSpc>
+              <a:spcBef>
+                <a:spcPts val="500"/>
+              </a:spcBef>
+              <a:buFont typeface="Arial"/>
+              <a:buNone/>
+              <a:defRPr sz="1600" kern="1200">
+                <a:solidFill>
+                  <a:schemeClr val="tx1"/>
+                </a:solidFill>
+                <a:latin typeface="+mn-lt"/>
+                <a:ea typeface="+mn-ea"/>
+                <a:cs typeface="+mn-cs"/>
+              </a:defRPr>
+            </a:lvl6pPr>
+            <a:lvl7pPr marL="2743200" indent="0" algn="ctr" defTabSz="914400" rtl="0" eaLnBrk="1" latinLnBrk="0" hangingPunct="1">
+              <a:lnSpc>
+                <a:spcPct val="90000"/>
+              </a:lnSpc>
+              <a:spcBef>
+                <a:spcPts val="500"/>
+              </a:spcBef>
+              <a:buFont typeface="Arial"/>
+              <a:buNone/>
+              <a:defRPr sz="1600" kern="1200">
+                <a:solidFill>
+                  <a:schemeClr val="tx1"/>
+                </a:solidFill>
+                <a:latin typeface="+mn-lt"/>
+                <a:ea typeface="+mn-ea"/>
+                <a:cs typeface="+mn-cs"/>
+              </a:defRPr>
+            </a:lvl7pPr>
+            <a:lvl8pPr marL="3200400" indent="0" algn="ctr" defTabSz="914400" rtl="0" eaLnBrk="1" latinLnBrk="0" hangingPunct="1">
+              <a:lnSpc>
+                <a:spcPct val="90000"/>
+              </a:lnSpc>
+              <a:spcBef>
+                <a:spcPts val="500"/>
+              </a:spcBef>
+              <a:buFont typeface="Arial"/>
+              <a:buNone/>
+              <a:defRPr sz="1600" kern="1200">
+                <a:solidFill>
+                  <a:schemeClr val="tx1"/>
+                </a:solidFill>
+                <a:latin typeface="+mn-lt"/>
+                <a:ea typeface="+mn-ea"/>
+                <a:cs typeface="+mn-cs"/>
+              </a:defRPr>
+            </a:lvl8pPr>
+            <a:lvl9pPr marL="3657600" indent="0" algn="ctr" defTabSz="914400" rtl="0" eaLnBrk="1" latinLnBrk="0" hangingPunct="1">
+              <a:lnSpc>
+                <a:spcPct val="90000"/>
+              </a:lnSpc>
+              <a:spcBef>
+                <a:spcPts val="500"/>
+              </a:spcBef>
+              <a:buFont typeface="Arial"/>
+              <a:buNone/>
+              <a:defRPr sz="1600" kern="1200">
+                <a:solidFill>
+                  <a:schemeClr val="tx1"/>
+                </a:solidFill>
+                <a:latin typeface="+mn-lt"/>
+                <a:ea typeface="+mn-ea"/>
+                <a:cs typeface="+mn-cs"/>
+              </a:defRPr>
+            </a:lvl9pPr>
+          </a:lstStyle>
+          <a:p>
+            <a:r>
+              <a:rPr lang="en-US" sz="3600" b="1" dirty="0">
+                <a:solidFill>
+                  <a:srgbClr val="CC0000"/>
+                </a:solidFill>
+                <a:latin typeface="Arial" charset="0"/>
+                <a:ea typeface="Arial" charset="0"/>
+                <a:cs typeface="Arial" charset="0"/>
+              </a:rPr>
+              <a:t>19</a:t>
+            </a:r>
+          </a:p>
+        </p:txBody>
+      </p:sp>
+      <p:sp>
+        <p:nvSpPr>
+          <p:cNvPr id="9" name="Subtitle 2">
+            <a:extLst>
+              <a:ext uri="{FF2B5EF4-FFF2-40B4-BE49-F238E27FC236}">
+                <a16:creationId xmlns:a16="http://schemas.microsoft.com/office/drawing/2014/main" id="{69B4978C-C42C-40BE-AF07-0CB60E2E289A}"/>
+              </a:ext>
+            </a:extLst>
+          </p:cNvPr>
+          <p:cNvSpPr txBox="1">
+            <a:spLocks/>
+          </p:cNvSpPr>
+          <p:nvPr/>
+        </p:nvSpPr>
+        <p:spPr>
+          <a:xfrm>
+            <a:off x="3757665" y="2910897"/>
+            <a:ext cx="2147095" cy="334531"/>
+          </a:xfrm>
+          <a:prstGeom prst="rect">
+            <a:avLst/>
+          </a:prstGeom>
+        </p:spPr>
+        <p:txBody>
+          <a:bodyPr vert="horz" lIns="91440" tIns="45720" rIns="91440" bIns="45720" rtlCol="0">
+            <a:normAutofit/>
+          </a:bodyPr>
+          <a:lstStyle>
+            <a:lvl1pPr marL="0" indent="0" algn="ctr" defTabSz="914400" rtl="0" eaLnBrk="1" latinLnBrk="0" hangingPunct="1">
+              <a:lnSpc>
+                <a:spcPct val="90000"/>
+              </a:lnSpc>
+              <a:spcBef>
+                <a:spcPts val="1000"/>
+              </a:spcBef>
+              <a:buFont typeface="Arial"/>
+              <a:buNone/>
+              <a:defRPr sz="2400" kern="1200">
+                <a:solidFill>
+                  <a:schemeClr val="tx1"/>
+                </a:solidFill>
+                <a:latin typeface="+mn-lt"/>
+                <a:ea typeface="+mn-ea"/>
+                <a:cs typeface="+mn-cs"/>
+              </a:defRPr>
+            </a:lvl1pPr>
+            <a:lvl2pPr marL="457200" indent="0" algn="ctr" defTabSz="914400" rtl="0" eaLnBrk="1" latinLnBrk="0" hangingPunct="1">
+              <a:lnSpc>
+                <a:spcPct val="90000"/>
+              </a:lnSpc>
+              <a:spcBef>
+                <a:spcPts val="500"/>
+              </a:spcBef>
+              <a:buFont typeface="Arial"/>
+              <a:buNone/>
+              <a:defRPr sz="2000" kern="1200">
+                <a:solidFill>
+                  <a:schemeClr val="tx1"/>
+                </a:solidFill>
+                <a:latin typeface="+mn-lt"/>
+                <a:ea typeface="+mn-ea"/>
+                <a:cs typeface="+mn-cs"/>
+              </a:defRPr>
+            </a:lvl2pPr>
+            <a:lvl3pPr marL="914400" indent="0" algn="ctr" defTabSz="914400" rtl="0" eaLnBrk="1" latinLnBrk="0" hangingPunct="1">
+              <a:lnSpc>
+                <a:spcPct val="90000"/>
+              </a:lnSpc>
+              <a:spcBef>
+                <a:spcPts val="500"/>
+              </a:spcBef>
+              <a:buFont typeface="Arial"/>
+              <a:buNone/>
+              <a:defRPr sz="1800" kern="1200">
+                <a:solidFill>
+                  <a:schemeClr val="tx1"/>
+                </a:solidFill>
+                <a:latin typeface="+mn-lt"/>
+                <a:ea typeface="+mn-ea"/>
+                <a:cs typeface="+mn-cs"/>
+              </a:defRPr>
+            </a:lvl3pPr>
+            <a:lvl4pPr marL="1371600" indent="0" algn="ctr" defTabSz="914400" rtl="0" eaLnBrk="1" latinLnBrk="0" hangingPunct="1">
+              <a:lnSpc>
+                <a:spcPct val="90000"/>
+              </a:lnSpc>
+              <a:spcBef>
+                <a:spcPts val="500"/>
+              </a:spcBef>
+              <a:buFont typeface="Arial"/>
+              <a:buNone/>
+              <a:defRPr sz="1600" kern="1200">
+                <a:solidFill>
+                  <a:schemeClr val="tx1"/>
+                </a:solidFill>
+                <a:latin typeface="+mn-lt"/>
+                <a:ea typeface="+mn-ea"/>
+                <a:cs typeface="+mn-cs"/>
+              </a:defRPr>
+            </a:lvl4pPr>
+            <a:lvl5pPr marL="1828800" indent="0" algn="ctr" defTabSz="914400" rtl="0" eaLnBrk="1" latinLnBrk="0" hangingPunct="1">
+              <a:lnSpc>
+                <a:spcPct val="90000"/>
+              </a:lnSpc>
+              <a:spcBef>
+                <a:spcPts val="500"/>
+              </a:spcBef>
+              <a:buFont typeface="Arial"/>
+              <a:buNone/>
+              <a:defRPr sz="1600" kern="1200">
+                <a:solidFill>
+                  <a:schemeClr val="tx1"/>
+                </a:solidFill>
+                <a:latin typeface="+mn-lt"/>
+                <a:ea typeface="+mn-ea"/>
+                <a:cs typeface="+mn-cs"/>
+              </a:defRPr>
+            </a:lvl5pPr>
+            <a:lvl6pPr marL="2286000" indent="0" algn="ctr" defTabSz="914400" rtl="0" eaLnBrk="1" latinLnBrk="0" hangingPunct="1">
+              <a:lnSpc>
+                <a:spcPct val="90000"/>
+              </a:lnSpc>
+              <a:spcBef>
+                <a:spcPts val="500"/>
+              </a:spcBef>
+              <a:buFont typeface="Arial"/>
+              <a:buNone/>
+              <a:defRPr sz="1600" kern="1200">
+                <a:solidFill>
+                  <a:schemeClr val="tx1"/>
+                </a:solidFill>
+                <a:latin typeface="+mn-lt"/>
+                <a:ea typeface="+mn-ea"/>
+                <a:cs typeface="+mn-cs"/>
+              </a:defRPr>
+            </a:lvl6pPr>
+            <a:lvl7pPr marL="2743200" indent="0" algn="ctr" defTabSz="914400" rtl="0" eaLnBrk="1" latinLnBrk="0" hangingPunct="1">
+              <a:lnSpc>
+                <a:spcPct val="90000"/>
+              </a:lnSpc>
+              <a:spcBef>
+                <a:spcPts val="500"/>
+              </a:spcBef>
+              <a:buFont typeface="Arial"/>
+              <a:buNone/>
+              <a:defRPr sz="1600" kern="1200">
+                <a:solidFill>
+                  <a:schemeClr val="tx1"/>
+                </a:solidFill>
+                <a:latin typeface="+mn-lt"/>
+                <a:ea typeface="+mn-ea"/>
+                <a:cs typeface="+mn-cs"/>
+              </a:defRPr>
+            </a:lvl7pPr>
+            <a:lvl8pPr marL="3200400" indent="0" algn="ctr" defTabSz="914400" rtl="0" eaLnBrk="1" latinLnBrk="0" hangingPunct="1">
+              <a:lnSpc>
+                <a:spcPct val="90000"/>
+              </a:lnSpc>
+              <a:spcBef>
+                <a:spcPts val="500"/>
+              </a:spcBef>
+              <a:buFont typeface="Arial"/>
+              <a:buNone/>
+              <a:defRPr sz="1600" kern="1200">
+                <a:solidFill>
+                  <a:schemeClr val="tx1"/>
+                </a:solidFill>
+                <a:latin typeface="+mn-lt"/>
+                <a:ea typeface="+mn-ea"/>
+                <a:cs typeface="+mn-cs"/>
+              </a:defRPr>
+            </a:lvl8pPr>
+            <a:lvl9pPr marL="3657600" indent="0" algn="ctr" defTabSz="914400" rtl="0" eaLnBrk="1" latinLnBrk="0" hangingPunct="1">
+              <a:lnSpc>
+                <a:spcPct val="90000"/>
+              </a:lnSpc>
+              <a:spcBef>
+                <a:spcPts val="500"/>
+              </a:spcBef>
+              <a:buFont typeface="Arial"/>
+              <a:buNone/>
+              <a:defRPr sz="1600" kern="1200">
+                <a:solidFill>
+                  <a:schemeClr val="tx1"/>
+                </a:solidFill>
+                <a:latin typeface="+mn-lt"/>
+                <a:ea typeface="+mn-ea"/>
+                <a:cs typeface="+mn-cs"/>
+              </a:defRPr>
+            </a:lvl9pPr>
+          </a:lstStyle>
+          <a:p>
+            <a:r>
+              <a:rPr lang="en-US" sz="1400">
+                <a:latin typeface="Arial" charset="0"/>
+                <a:ea typeface="Arial" charset="0"/>
+                <a:cs typeface="Arial" charset="0"/>
+              </a:rPr>
+              <a:t>years old</a:t>
+            </a:r>
+          </a:p>
+        </p:txBody>
+      </p:sp>
+      <p:sp>
+        <p:nvSpPr>
+          <p:cNvPr id="11" name="Subtitle 2">
+            <a:extLst>
+              <a:ext uri="{FF2B5EF4-FFF2-40B4-BE49-F238E27FC236}">
+                <a16:creationId xmlns:a16="http://schemas.microsoft.com/office/drawing/2014/main" id="{E27E2E5B-A484-4D57-B5B5-602AD8121417}"/>
+              </a:ext>
+            </a:extLst>
+          </p:cNvPr>
+          <p:cNvSpPr txBox="1">
+            <a:spLocks/>
+          </p:cNvSpPr>
+          <p:nvPr/>
+        </p:nvSpPr>
+        <p:spPr>
+          <a:xfrm>
+            <a:off x="6317663" y="2354219"/>
+            <a:ext cx="2037381" cy="481765"/>
+          </a:xfrm>
+          <a:prstGeom prst="rect">
+            <a:avLst/>
+          </a:prstGeom>
+        </p:spPr>
+        <p:txBody>
+          <a:bodyPr vert="horz" lIns="91440" tIns="45720" rIns="91440" bIns="45720" rtlCol="0">
+            <a:noAutofit/>
+          </a:bodyPr>
+          <a:lstStyle>
+            <a:lvl1pPr marL="0" indent="0" algn="ctr" defTabSz="914400" rtl="0" eaLnBrk="1" latinLnBrk="0" hangingPunct="1">
+              <a:lnSpc>
+                <a:spcPct val="90000"/>
+              </a:lnSpc>
+              <a:spcBef>
+                <a:spcPts val="1000"/>
+              </a:spcBef>
+              <a:buFont typeface="Arial"/>
+              <a:buNone/>
+              <a:defRPr sz="2400" kern="1200">
+                <a:solidFill>
+                  <a:schemeClr val="tx1"/>
+                </a:solidFill>
+                <a:latin typeface="+mn-lt"/>
+                <a:ea typeface="+mn-ea"/>
+                <a:cs typeface="+mn-cs"/>
+              </a:defRPr>
+            </a:lvl1pPr>
+            <a:lvl2pPr marL="457200" indent="0" algn="ctr" defTabSz="914400" rtl="0" eaLnBrk="1" latinLnBrk="0" hangingPunct="1">
+              <a:lnSpc>
+                <a:spcPct val="90000"/>
+              </a:lnSpc>
+              <a:spcBef>
+                <a:spcPts val="500"/>
+              </a:spcBef>
+              <a:buFont typeface="Arial"/>
+              <a:buNone/>
+              <a:defRPr sz="2000" kern="1200">
+                <a:solidFill>
+                  <a:schemeClr val="tx1"/>
+                </a:solidFill>
+                <a:latin typeface="+mn-lt"/>
+                <a:ea typeface="+mn-ea"/>
+                <a:cs typeface="+mn-cs"/>
+              </a:defRPr>
+            </a:lvl2pPr>
+            <a:lvl3pPr marL="914400" indent="0" algn="ctr" defTabSz="914400" rtl="0" eaLnBrk="1" latinLnBrk="0" hangingPunct="1">
+              <a:lnSpc>
+                <a:spcPct val="90000"/>
+              </a:lnSpc>
+              <a:spcBef>
+                <a:spcPts val="500"/>
+              </a:spcBef>
+              <a:buFont typeface="Arial"/>
+              <a:buNone/>
+              <a:defRPr sz="1800" kern="1200">
+                <a:solidFill>
+                  <a:schemeClr val="tx1"/>
+                </a:solidFill>
+                <a:latin typeface="+mn-lt"/>
+                <a:ea typeface="+mn-ea"/>
+                <a:cs typeface="+mn-cs"/>
+              </a:defRPr>
+            </a:lvl3pPr>
+            <a:lvl4pPr marL="1371600" indent="0" algn="ctr" defTabSz="914400" rtl="0" eaLnBrk="1" latinLnBrk="0" hangingPunct="1">
+              <a:lnSpc>
+                <a:spcPct val="90000"/>
+              </a:lnSpc>
+              <a:spcBef>
+                <a:spcPts val="500"/>
+              </a:spcBef>
+              <a:buFont typeface="Arial"/>
+              <a:buNone/>
+              <a:defRPr sz="1600" kern="1200">
+                <a:solidFill>
+                  <a:schemeClr val="tx1"/>
+                </a:solidFill>
+                <a:latin typeface="+mn-lt"/>
+                <a:ea typeface="+mn-ea"/>
+                <a:cs typeface="+mn-cs"/>
+              </a:defRPr>
+            </a:lvl4pPr>
+            <a:lvl5pPr marL="1828800" indent="0" algn="ctr" defTabSz="914400" rtl="0" eaLnBrk="1" latinLnBrk="0" hangingPunct="1">
+              <a:lnSpc>
+                <a:spcPct val="90000"/>
+              </a:lnSpc>
+              <a:spcBef>
+                <a:spcPts val="500"/>
+              </a:spcBef>
+              <a:buFont typeface="Arial"/>
+              <a:buNone/>
+              <a:defRPr sz="1600" kern="1200">
+                <a:solidFill>
+                  <a:schemeClr val="tx1"/>
+                </a:solidFill>
+                <a:latin typeface="+mn-lt"/>
+                <a:ea typeface="+mn-ea"/>
+                <a:cs typeface="+mn-cs"/>
+              </a:defRPr>
+            </a:lvl5pPr>
+            <a:lvl6pPr marL="2286000" indent="0" algn="ctr" defTabSz="914400" rtl="0" eaLnBrk="1" latinLnBrk="0" hangingPunct="1">
+              <a:lnSpc>
+                <a:spcPct val="90000"/>
+              </a:lnSpc>
+              <a:spcBef>
+                <a:spcPts val="500"/>
+              </a:spcBef>
+              <a:buFont typeface="Arial"/>
+              <a:buNone/>
+              <a:defRPr sz="1600" kern="1200">
+                <a:solidFill>
+                  <a:schemeClr val="tx1"/>
+                </a:solidFill>
+                <a:latin typeface="+mn-lt"/>
+                <a:ea typeface="+mn-ea"/>
+                <a:cs typeface="+mn-cs"/>
+              </a:defRPr>
+            </a:lvl6pPr>
+            <a:lvl7pPr marL="2743200" indent="0" algn="ctr" defTabSz="914400" rtl="0" eaLnBrk="1" latinLnBrk="0" hangingPunct="1">
+              <a:lnSpc>
+                <a:spcPct val="90000"/>
+              </a:lnSpc>
+              <a:spcBef>
+                <a:spcPts val="500"/>
+              </a:spcBef>
+              <a:buFont typeface="Arial"/>
+              <a:buNone/>
+              <a:defRPr sz="1600" kern="1200">
+                <a:solidFill>
+                  <a:schemeClr val="tx1"/>
+                </a:solidFill>
+                <a:latin typeface="+mn-lt"/>
+                <a:ea typeface="+mn-ea"/>
+                <a:cs typeface="+mn-cs"/>
+              </a:defRPr>
+            </a:lvl7pPr>
+            <a:lvl8pPr marL="3200400" indent="0" algn="ctr" defTabSz="914400" rtl="0" eaLnBrk="1" latinLnBrk="0" hangingPunct="1">
+              <a:lnSpc>
+                <a:spcPct val="90000"/>
+              </a:lnSpc>
+              <a:spcBef>
+                <a:spcPts val="500"/>
+              </a:spcBef>
+              <a:buFont typeface="Arial"/>
+              <a:buNone/>
+              <a:defRPr sz="1600" kern="1200">
+                <a:solidFill>
+                  <a:schemeClr val="tx1"/>
+                </a:solidFill>
+                <a:latin typeface="+mn-lt"/>
+                <a:ea typeface="+mn-ea"/>
+                <a:cs typeface="+mn-cs"/>
+              </a:defRPr>
+            </a:lvl8pPr>
+            <a:lvl9pPr marL="3657600" indent="0" algn="ctr" defTabSz="914400" rtl="0" eaLnBrk="1" latinLnBrk="0" hangingPunct="1">
+              <a:lnSpc>
+                <a:spcPct val="90000"/>
+              </a:lnSpc>
+              <a:spcBef>
+                <a:spcPts val="500"/>
+              </a:spcBef>
+              <a:buFont typeface="Arial"/>
+              <a:buNone/>
+              <a:defRPr sz="1600" kern="1200">
+                <a:solidFill>
+                  <a:schemeClr val="tx1"/>
+                </a:solidFill>
+                <a:latin typeface="+mn-lt"/>
+                <a:ea typeface="+mn-ea"/>
+                <a:cs typeface="+mn-cs"/>
+              </a:defRPr>
+            </a:lvl9pPr>
+          </a:lstStyle>
+          <a:p>
+            <a:r>
+              <a:rPr lang="en-US" sz="3600" b="1" dirty="0">
+                <a:solidFill>
+                  <a:srgbClr val="CC0000"/>
+                </a:solidFill>
+                <a:latin typeface="Arial" charset="0"/>
+                <a:ea typeface="Arial" charset="0"/>
+                <a:cs typeface="Arial" charset="0"/>
+              </a:rPr>
+              <a:t>202,000</a:t>
+            </a:r>
+          </a:p>
+        </p:txBody>
+      </p:sp>
+      <p:sp>
+        <p:nvSpPr>
+          <p:cNvPr id="12" name="Subtitle 2">
+            <a:extLst>
+              <a:ext uri="{FF2B5EF4-FFF2-40B4-BE49-F238E27FC236}">
+                <a16:creationId xmlns:a16="http://schemas.microsoft.com/office/drawing/2014/main" id="{4A3775BB-9129-44B5-95C1-E87A632A8B42}"/>
+              </a:ext>
+            </a:extLst>
+          </p:cNvPr>
+          <p:cNvSpPr txBox="1">
+            <a:spLocks/>
+          </p:cNvSpPr>
+          <p:nvPr/>
+        </p:nvSpPr>
+        <p:spPr>
+          <a:xfrm>
+            <a:off x="6262806" y="2910897"/>
+            <a:ext cx="2147095" cy="334531"/>
+          </a:xfrm>
+          <a:prstGeom prst="rect">
+            <a:avLst/>
+          </a:prstGeom>
+        </p:spPr>
+        <p:txBody>
+          <a:bodyPr vert="horz" lIns="91440" tIns="45720" rIns="91440" bIns="45720" rtlCol="0">
+            <a:normAutofit/>
+          </a:bodyPr>
+          <a:lstStyle>
+            <a:lvl1pPr marL="0" indent="0" algn="ctr" defTabSz="914400" rtl="0" eaLnBrk="1" latinLnBrk="0" hangingPunct="1">
+              <a:lnSpc>
+                <a:spcPct val="90000"/>
+              </a:lnSpc>
+              <a:spcBef>
+                <a:spcPts val="1000"/>
+              </a:spcBef>
+              <a:buFont typeface="Arial"/>
+              <a:buNone/>
+              <a:defRPr sz="2400" kern="1200">
+                <a:solidFill>
+                  <a:schemeClr val="tx1"/>
+                </a:solidFill>
+                <a:latin typeface="+mn-lt"/>
+                <a:ea typeface="+mn-ea"/>
+                <a:cs typeface="+mn-cs"/>
+              </a:defRPr>
+            </a:lvl1pPr>
+            <a:lvl2pPr marL="457200" indent="0" algn="ctr" defTabSz="914400" rtl="0" eaLnBrk="1" latinLnBrk="0" hangingPunct="1">
+              <a:lnSpc>
+                <a:spcPct val="90000"/>
+              </a:lnSpc>
+              <a:spcBef>
+                <a:spcPts val="500"/>
+              </a:spcBef>
+              <a:buFont typeface="Arial"/>
+              <a:buNone/>
+              <a:defRPr sz="2000" kern="1200">
+                <a:solidFill>
+                  <a:schemeClr val="tx1"/>
+                </a:solidFill>
+                <a:latin typeface="+mn-lt"/>
+                <a:ea typeface="+mn-ea"/>
+                <a:cs typeface="+mn-cs"/>
+              </a:defRPr>
+            </a:lvl2pPr>
+            <a:lvl3pPr marL="914400" indent="0" algn="ctr" defTabSz="914400" rtl="0" eaLnBrk="1" latinLnBrk="0" hangingPunct="1">
+              <a:lnSpc>
+                <a:spcPct val="90000"/>
+              </a:lnSpc>
+              <a:spcBef>
+                <a:spcPts val="500"/>
+              </a:spcBef>
+              <a:buFont typeface="Arial"/>
+              <a:buNone/>
+              <a:defRPr sz="1800" kern="1200">
+                <a:solidFill>
+                  <a:schemeClr val="tx1"/>
+                </a:solidFill>
+                <a:latin typeface="+mn-lt"/>
+                <a:ea typeface="+mn-ea"/>
+                <a:cs typeface="+mn-cs"/>
+              </a:defRPr>
+            </a:lvl3pPr>
+            <a:lvl4pPr marL="1371600" indent="0" algn="ctr" defTabSz="914400" rtl="0" eaLnBrk="1" latinLnBrk="0" hangingPunct="1">
+              <a:lnSpc>
+                <a:spcPct val="90000"/>
+              </a:lnSpc>
+              <a:spcBef>
+                <a:spcPts val="500"/>
+              </a:spcBef>
+              <a:buFont typeface="Arial"/>
+              <a:buNone/>
+              <a:defRPr sz="1600" kern="1200">
+                <a:solidFill>
+                  <a:schemeClr val="tx1"/>
+                </a:solidFill>
+                <a:latin typeface="+mn-lt"/>
+                <a:ea typeface="+mn-ea"/>
+                <a:cs typeface="+mn-cs"/>
+              </a:defRPr>
+            </a:lvl4pPr>
+            <a:lvl5pPr marL="1828800" indent="0" algn="ctr" defTabSz="914400" rtl="0" eaLnBrk="1" latinLnBrk="0" hangingPunct="1">
+              <a:lnSpc>
+                <a:spcPct val="90000"/>
+              </a:lnSpc>
+              <a:spcBef>
+                <a:spcPts val="500"/>
+              </a:spcBef>
+              <a:buFont typeface="Arial"/>
+              <a:buNone/>
+              <a:defRPr sz="1600" kern="1200">
+                <a:solidFill>
+                  <a:schemeClr val="tx1"/>
+                </a:solidFill>
+                <a:latin typeface="+mn-lt"/>
+                <a:ea typeface="+mn-ea"/>
+                <a:cs typeface="+mn-cs"/>
+              </a:defRPr>
+            </a:lvl5pPr>
+            <a:lvl6pPr marL="2286000" indent="0" algn="ctr" defTabSz="914400" rtl="0" eaLnBrk="1" latinLnBrk="0" hangingPunct="1">
+              <a:lnSpc>
+                <a:spcPct val="90000"/>
+              </a:lnSpc>
+              <a:spcBef>
+                <a:spcPts val="500"/>
+              </a:spcBef>
+              <a:buFont typeface="Arial"/>
+              <a:buNone/>
+              <a:defRPr sz="1600" kern="1200">
+                <a:solidFill>
+                  <a:schemeClr val="tx1"/>
+                </a:solidFill>
+                <a:latin typeface="+mn-lt"/>
+                <a:ea typeface="+mn-ea"/>
+                <a:cs typeface="+mn-cs"/>
+              </a:defRPr>
+            </a:lvl6pPr>
+            <a:lvl7pPr marL="2743200" indent="0" algn="ctr" defTabSz="914400" rtl="0" eaLnBrk="1" latinLnBrk="0" hangingPunct="1">
+              <a:lnSpc>
+                <a:spcPct val="90000"/>
+              </a:lnSpc>
+              <a:spcBef>
+                <a:spcPts val="500"/>
+              </a:spcBef>
+              <a:buFont typeface="Arial"/>
+              <a:buNone/>
+              <a:defRPr sz="1600" kern="1200">
+                <a:solidFill>
+                  <a:schemeClr val="tx1"/>
+                </a:solidFill>
+                <a:latin typeface="+mn-lt"/>
+                <a:ea typeface="+mn-ea"/>
+                <a:cs typeface="+mn-cs"/>
+              </a:defRPr>
+            </a:lvl7pPr>
+            <a:lvl8pPr marL="3200400" indent="0" algn="ctr" defTabSz="914400" rtl="0" eaLnBrk="1" latinLnBrk="0" hangingPunct="1">
+              <a:lnSpc>
+                <a:spcPct val="90000"/>
+              </a:lnSpc>
+              <a:spcBef>
+                <a:spcPts val="500"/>
+              </a:spcBef>
+              <a:buFont typeface="Arial"/>
+              <a:buNone/>
+              <a:defRPr sz="1600" kern="1200">
+                <a:solidFill>
+                  <a:schemeClr val="tx1"/>
+                </a:solidFill>
+                <a:latin typeface="+mn-lt"/>
+                <a:ea typeface="+mn-ea"/>
+                <a:cs typeface="+mn-cs"/>
+              </a:defRPr>
+            </a:lvl8pPr>
+            <a:lvl9pPr marL="3657600" indent="0" algn="ctr" defTabSz="914400" rtl="0" eaLnBrk="1" latinLnBrk="0" hangingPunct="1">
+              <a:lnSpc>
+                <a:spcPct val="90000"/>
+              </a:lnSpc>
+              <a:spcBef>
+                <a:spcPts val="500"/>
+              </a:spcBef>
+              <a:buFont typeface="Arial"/>
+              <a:buNone/>
+              <a:defRPr sz="1600" kern="1200">
+                <a:solidFill>
+                  <a:schemeClr val="tx1"/>
+                </a:solidFill>
+                <a:latin typeface="+mn-lt"/>
+                <a:ea typeface="+mn-ea"/>
+                <a:cs typeface="+mn-cs"/>
+              </a:defRPr>
+            </a:lvl9pPr>
+          </a:lstStyle>
+          <a:p>
+            <a:r>
+              <a:rPr lang="en-US" sz="1400">
+                <a:latin typeface="Arial" charset="0"/>
+                <a:ea typeface="Arial" charset="0"/>
+                <a:cs typeface="Arial" charset="0"/>
+              </a:rPr>
+              <a:t>customers</a:t>
+            </a:r>
+          </a:p>
+        </p:txBody>
+      </p:sp>
+      <p:sp>
+        <p:nvSpPr>
+          <p:cNvPr id="13" name="Subtitle 2">
+            <a:extLst>
+              <a:ext uri="{FF2B5EF4-FFF2-40B4-BE49-F238E27FC236}">
+                <a16:creationId xmlns:a16="http://schemas.microsoft.com/office/drawing/2014/main" id="{7DE2956A-176F-491B-8D4D-8C9744D93307}"/>
+              </a:ext>
+            </a:extLst>
+          </p:cNvPr>
+          <p:cNvSpPr txBox="1">
+            <a:spLocks/>
+          </p:cNvSpPr>
+          <p:nvPr/>
+        </p:nvSpPr>
+        <p:spPr>
+          <a:xfrm>
+            <a:off x="8845370" y="2293259"/>
+            <a:ext cx="2037381" cy="481765"/>
+          </a:xfrm>
+          <a:prstGeom prst="rect">
+            <a:avLst/>
+          </a:prstGeom>
+        </p:spPr>
+        <p:txBody>
+          <a:bodyPr vert="horz" lIns="91440" tIns="45720" rIns="91440" bIns="45720" rtlCol="0">
+            <a:noAutofit/>
+          </a:bodyPr>
+          <a:lstStyle>
+            <a:lvl1pPr marL="0" indent="0" algn="ctr" defTabSz="914400" rtl="0" eaLnBrk="1" latinLnBrk="0" hangingPunct="1">
+              <a:lnSpc>
+                <a:spcPct val="90000"/>
+              </a:lnSpc>
+              <a:spcBef>
+                <a:spcPts val="1000"/>
+              </a:spcBef>
+              <a:buFont typeface="Arial"/>
+              <a:buNone/>
+              <a:defRPr sz="2400" kern="1200">
+                <a:solidFill>
+                  <a:schemeClr val="tx1"/>
+                </a:solidFill>
+                <a:latin typeface="+mn-lt"/>
+                <a:ea typeface="+mn-ea"/>
+                <a:cs typeface="+mn-cs"/>
+              </a:defRPr>
+            </a:lvl1pPr>
+            <a:lvl2pPr marL="457200" indent="0" algn="ctr" defTabSz="914400" rtl="0" eaLnBrk="1" latinLnBrk="0" hangingPunct="1">
+              <a:lnSpc>
+                <a:spcPct val="90000"/>
+              </a:lnSpc>
+              <a:spcBef>
+                <a:spcPts val="500"/>
+              </a:spcBef>
+              <a:buFont typeface="Arial"/>
+              <a:buNone/>
+              <a:defRPr sz="2000" kern="1200">
+                <a:solidFill>
+                  <a:schemeClr val="tx1"/>
+                </a:solidFill>
+                <a:latin typeface="+mn-lt"/>
+                <a:ea typeface="+mn-ea"/>
+                <a:cs typeface="+mn-cs"/>
+              </a:defRPr>
+            </a:lvl2pPr>
+            <a:lvl3pPr marL="914400" indent="0" algn="ctr" defTabSz="914400" rtl="0" eaLnBrk="1" latinLnBrk="0" hangingPunct="1">
+              <a:lnSpc>
+                <a:spcPct val="90000"/>
+              </a:lnSpc>
+              <a:spcBef>
+                <a:spcPts val="500"/>
+              </a:spcBef>
+              <a:buFont typeface="Arial"/>
+              <a:buNone/>
+              <a:defRPr sz="1800" kern="1200">
+                <a:solidFill>
+                  <a:schemeClr val="tx1"/>
+                </a:solidFill>
+                <a:latin typeface="+mn-lt"/>
+                <a:ea typeface="+mn-ea"/>
+                <a:cs typeface="+mn-cs"/>
+              </a:defRPr>
+            </a:lvl3pPr>
+            <a:lvl4pPr marL="1371600" indent="0" algn="ctr" defTabSz="914400" rtl="0" eaLnBrk="1" latinLnBrk="0" hangingPunct="1">
+              <a:lnSpc>
+                <a:spcPct val="90000"/>
+              </a:lnSpc>
+              <a:spcBef>
+                <a:spcPts val="500"/>
+              </a:spcBef>
+              <a:buFont typeface="Arial"/>
+              <a:buNone/>
+              <a:defRPr sz="1600" kern="1200">
+                <a:solidFill>
+                  <a:schemeClr val="tx1"/>
+                </a:solidFill>
+                <a:latin typeface="+mn-lt"/>
+                <a:ea typeface="+mn-ea"/>
+                <a:cs typeface="+mn-cs"/>
+              </a:defRPr>
+            </a:lvl4pPr>
+            <a:lvl5pPr marL="1828800" indent="0" algn="ctr" defTabSz="914400" rtl="0" eaLnBrk="1" latinLnBrk="0" hangingPunct="1">
+              <a:lnSpc>
+                <a:spcPct val="90000"/>
+              </a:lnSpc>
+              <a:spcBef>
+                <a:spcPts val="500"/>
+              </a:spcBef>
+              <a:buFont typeface="Arial"/>
+              <a:buNone/>
+              <a:defRPr sz="1600" kern="1200">
+                <a:solidFill>
+                  <a:schemeClr val="tx1"/>
+                </a:solidFill>
+                <a:latin typeface="+mn-lt"/>
+                <a:ea typeface="+mn-ea"/>
+                <a:cs typeface="+mn-cs"/>
+              </a:defRPr>
+            </a:lvl5pPr>
+            <a:lvl6pPr marL="2286000" indent="0" algn="ctr" defTabSz="914400" rtl="0" eaLnBrk="1" latinLnBrk="0" hangingPunct="1">
+              <a:lnSpc>
+                <a:spcPct val="90000"/>
+              </a:lnSpc>
+              <a:spcBef>
+                <a:spcPts val="500"/>
+              </a:spcBef>
+              <a:buFont typeface="Arial"/>
+              <a:buNone/>
+              <a:defRPr sz="1600" kern="1200">
+                <a:solidFill>
+                  <a:schemeClr val="tx1"/>
+                </a:solidFill>
+                <a:latin typeface="+mn-lt"/>
+                <a:ea typeface="+mn-ea"/>
+                <a:cs typeface="+mn-cs"/>
+              </a:defRPr>
+            </a:lvl6pPr>
+            <a:lvl7pPr marL="2743200" indent="0" algn="ctr" defTabSz="914400" rtl="0" eaLnBrk="1" latinLnBrk="0" hangingPunct="1">
+              <a:lnSpc>
+                <a:spcPct val="90000"/>
+              </a:lnSpc>
+              <a:spcBef>
+                <a:spcPts val="500"/>
+              </a:spcBef>
+              <a:buFont typeface="Arial"/>
+              <a:buNone/>
+              <a:defRPr sz="1600" kern="1200">
+                <a:solidFill>
+                  <a:schemeClr val="tx1"/>
+                </a:solidFill>
+                <a:latin typeface="+mn-lt"/>
+                <a:ea typeface="+mn-ea"/>
+                <a:cs typeface="+mn-cs"/>
+              </a:defRPr>
+            </a:lvl7pPr>
+            <a:lvl8pPr marL="3200400" indent="0" algn="ctr" defTabSz="914400" rtl="0" eaLnBrk="1" latinLnBrk="0" hangingPunct="1">
+              <a:lnSpc>
+                <a:spcPct val="90000"/>
+              </a:lnSpc>
+              <a:spcBef>
+                <a:spcPts val="500"/>
+              </a:spcBef>
+              <a:buFont typeface="Arial"/>
+              <a:buNone/>
+              <a:defRPr sz="1600" kern="1200">
+                <a:solidFill>
+                  <a:schemeClr val="tx1"/>
+                </a:solidFill>
+                <a:latin typeface="+mn-lt"/>
+                <a:ea typeface="+mn-ea"/>
+                <a:cs typeface="+mn-cs"/>
+              </a:defRPr>
+            </a:lvl8pPr>
+            <a:lvl9pPr marL="3657600" indent="0" algn="ctr" defTabSz="914400" rtl="0" eaLnBrk="1" latinLnBrk="0" hangingPunct="1">
+              <a:lnSpc>
+                <a:spcPct val="90000"/>
+              </a:lnSpc>
+              <a:spcBef>
+                <a:spcPts val="500"/>
+              </a:spcBef>
+              <a:buFont typeface="Arial"/>
+              <a:buNone/>
+              <a:defRPr sz="1600" kern="1200">
+                <a:solidFill>
+                  <a:schemeClr val="tx1"/>
+                </a:solidFill>
+                <a:latin typeface="+mn-lt"/>
+                <a:ea typeface="+mn-ea"/>
+                <a:cs typeface="+mn-cs"/>
+              </a:defRPr>
+            </a:lvl9pPr>
+          </a:lstStyle>
+          <a:p>
+            <a:r>
+              <a:rPr lang="en-US" sz="3600" b="1">
+                <a:solidFill>
+                  <a:srgbClr val="CC0000"/>
+                </a:solidFill>
+                <a:latin typeface="Arial" charset="0"/>
+                <a:ea typeface="Arial" charset="0"/>
+                <a:cs typeface="Arial" charset="0"/>
+              </a:rPr>
+              <a:t>2m</a:t>
+            </a:r>
+          </a:p>
+        </p:txBody>
+      </p:sp>
+      <p:sp>
+        <p:nvSpPr>
+          <p:cNvPr id="14" name="Subtitle 2">
+            <a:extLst>
+              <a:ext uri="{FF2B5EF4-FFF2-40B4-BE49-F238E27FC236}">
+                <a16:creationId xmlns:a16="http://schemas.microsoft.com/office/drawing/2014/main" id="{1F0F2627-D0AF-404B-A4E8-DBEF116BAE01}"/>
+              </a:ext>
+            </a:extLst>
+          </p:cNvPr>
+          <p:cNvSpPr txBox="1">
+            <a:spLocks/>
+          </p:cNvSpPr>
+          <p:nvPr/>
+        </p:nvSpPr>
+        <p:spPr>
+          <a:xfrm>
+            <a:off x="8790513" y="2890577"/>
+            <a:ext cx="2147095" cy="505008"/>
+          </a:xfrm>
+          <a:prstGeom prst="rect">
+            <a:avLst/>
+          </a:prstGeom>
+        </p:spPr>
+        <p:txBody>
+          <a:bodyPr vert="horz" lIns="91440" tIns="45720" rIns="91440" bIns="45720" rtlCol="0">
+            <a:normAutofit/>
+          </a:bodyPr>
+          <a:lstStyle>
+            <a:lvl1pPr marL="0" indent="0" algn="ctr" defTabSz="914400" rtl="0" eaLnBrk="1" latinLnBrk="0" hangingPunct="1">
+              <a:lnSpc>
+                <a:spcPct val="90000"/>
+              </a:lnSpc>
+              <a:spcBef>
+                <a:spcPts val="1000"/>
+              </a:spcBef>
+              <a:buFont typeface="Arial"/>
+              <a:buNone/>
+              <a:defRPr sz="2400" kern="1200">
+                <a:solidFill>
+                  <a:schemeClr val="tx1"/>
+                </a:solidFill>
+                <a:latin typeface="+mn-lt"/>
+                <a:ea typeface="+mn-ea"/>
+                <a:cs typeface="+mn-cs"/>
+              </a:defRPr>
+            </a:lvl1pPr>
+            <a:lvl2pPr marL="457200" indent="0" algn="ctr" defTabSz="914400" rtl="0" eaLnBrk="1" latinLnBrk="0" hangingPunct="1">
+              <a:lnSpc>
+                <a:spcPct val="90000"/>
+              </a:lnSpc>
+              <a:spcBef>
+                <a:spcPts val="500"/>
+              </a:spcBef>
+              <a:buFont typeface="Arial"/>
+              <a:buNone/>
+              <a:defRPr sz="2000" kern="1200">
+                <a:solidFill>
+                  <a:schemeClr val="tx1"/>
+                </a:solidFill>
+                <a:latin typeface="+mn-lt"/>
+                <a:ea typeface="+mn-ea"/>
+                <a:cs typeface="+mn-cs"/>
+              </a:defRPr>
+            </a:lvl2pPr>
+            <a:lvl3pPr marL="914400" indent="0" algn="ctr" defTabSz="914400" rtl="0" eaLnBrk="1" latinLnBrk="0" hangingPunct="1">
+              <a:lnSpc>
+                <a:spcPct val="90000"/>
+              </a:lnSpc>
+              <a:spcBef>
+                <a:spcPts val="500"/>
+              </a:spcBef>
+              <a:buFont typeface="Arial"/>
+              <a:buNone/>
+              <a:defRPr sz="1800" kern="1200">
+                <a:solidFill>
+                  <a:schemeClr val="tx1"/>
+                </a:solidFill>
+                <a:latin typeface="+mn-lt"/>
+                <a:ea typeface="+mn-ea"/>
+                <a:cs typeface="+mn-cs"/>
+              </a:defRPr>
+            </a:lvl3pPr>
+            <a:lvl4pPr marL="1371600" indent="0" algn="ctr" defTabSz="914400" rtl="0" eaLnBrk="1" latinLnBrk="0" hangingPunct="1">
+              <a:lnSpc>
+                <a:spcPct val="90000"/>
+              </a:lnSpc>
+              <a:spcBef>
+                <a:spcPts val="500"/>
+              </a:spcBef>
+              <a:buFont typeface="Arial"/>
+              <a:buNone/>
+              <a:defRPr sz="1600" kern="1200">
+                <a:solidFill>
+                  <a:schemeClr val="tx1"/>
+                </a:solidFill>
+                <a:latin typeface="+mn-lt"/>
+                <a:ea typeface="+mn-ea"/>
+                <a:cs typeface="+mn-cs"/>
+              </a:defRPr>
+            </a:lvl4pPr>
+            <a:lvl5pPr marL="1828800" indent="0" algn="ctr" defTabSz="914400" rtl="0" eaLnBrk="1" latinLnBrk="0" hangingPunct="1">
+              <a:lnSpc>
+                <a:spcPct val="90000"/>
+              </a:lnSpc>
+              <a:spcBef>
+                <a:spcPts val="500"/>
+              </a:spcBef>
+              <a:buFont typeface="Arial"/>
+              <a:buNone/>
+              <a:defRPr sz="1600" kern="1200">
+                <a:solidFill>
+                  <a:schemeClr val="tx1"/>
+                </a:solidFill>
+                <a:latin typeface="+mn-lt"/>
+                <a:ea typeface="+mn-ea"/>
+                <a:cs typeface="+mn-cs"/>
+              </a:defRPr>
+            </a:lvl5pPr>
+            <a:lvl6pPr marL="2286000" indent="0" algn="ctr" defTabSz="914400" rtl="0" eaLnBrk="1" latinLnBrk="0" hangingPunct="1">
+              <a:lnSpc>
+                <a:spcPct val="90000"/>
+              </a:lnSpc>
+              <a:spcBef>
+                <a:spcPts val="500"/>
+              </a:spcBef>
+              <a:buFont typeface="Arial"/>
+              <a:buNone/>
+              <a:defRPr sz="1600" kern="1200">
+                <a:solidFill>
+                  <a:schemeClr val="tx1"/>
+                </a:solidFill>
+                <a:latin typeface="+mn-lt"/>
+                <a:ea typeface="+mn-ea"/>
+                <a:cs typeface="+mn-cs"/>
+              </a:defRPr>
+            </a:lvl6pPr>
+            <a:lvl7pPr marL="2743200" indent="0" algn="ctr" defTabSz="914400" rtl="0" eaLnBrk="1" latinLnBrk="0" hangingPunct="1">
+              <a:lnSpc>
+                <a:spcPct val="90000"/>
+              </a:lnSpc>
+              <a:spcBef>
+                <a:spcPts val="500"/>
+              </a:spcBef>
+              <a:buFont typeface="Arial"/>
+              <a:buNone/>
+              <a:defRPr sz="1600" kern="1200">
+                <a:solidFill>
+                  <a:schemeClr val="tx1"/>
+                </a:solidFill>
+                <a:latin typeface="+mn-lt"/>
+                <a:ea typeface="+mn-ea"/>
+                <a:cs typeface="+mn-cs"/>
+              </a:defRPr>
+            </a:lvl7pPr>
+            <a:lvl8pPr marL="3200400" indent="0" algn="ctr" defTabSz="914400" rtl="0" eaLnBrk="1" latinLnBrk="0" hangingPunct="1">
+              <a:lnSpc>
+                <a:spcPct val="90000"/>
+              </a:lnSpc>
+              <a:spcBef>
+                <a:spcPts val="500"/>
+              </a:spcBef>
+              <a:buFont typeface="Arial"/>
+              <a:buNone/>
+              <a:defRPr sz="1600" kern="1200">
+                <a:solidFill>
+                  <a:schemeClr val="tx1"/>
+                </a:solidFill>
+                <a:latin typeface="+mn-lt"/>
+                <a:ea typeface="+mn-ea"/>
+                <a:cs typeface="+mn-cs"/>
+              </a:defRPr>
+            </a:lvl8pPr>
+            <a:lvl9pPr marL="3657600" indent="0" algn="ctr" defTabSz="914400" rtl="0" eaLnBrk="1" latinLnBrk="0" hangingPunct="1">
+              <a:lnSpc>
+                <a:spcPct val="90000"/>
+              </a:lnSpc>
+              <a:spcBef>
+                <a:spcPts val="500"/>
+              </a:spcBef>
+              <a:buFont typeface="Arial"/>
+              <a:buNone/>
+              <a:defRPr sz="1600" kern="1200">
+                <a:solidFill>
+                  <a:schemeClr val="tx1"/>
+                </a:solidFill>
+                <a:latin typeface="+mn-lt"/>
+                <a:ea typeface="+mn-ea"/>
+                <a:cs typeface="+mn-cs"/>
+              </a:defRPr>
+            </a:lvl9pPr>
+          </a:lstStyle>
+          <a:p>
+            <a:r>
+              <a:rPr lang="en-US" sz="1400">
+                <a:latin typeface="Arial" charset="0"/>
+                <a:ea typeface="Arial" charset="0"/>
+                <a:cs typeface="Arial" charset="0"/>
+              </a:rPr>
+              <a:t>SQL Server Central and Simple Talk users</a:t>
+            </a:r>
+          </a:p>
+        </p:txBody>
+      </p:sp>
+      <p:sp>
+        <p:nvSpPr>
+          <p:cNvPr id="16" name="Subtitle 2">
+            <a:extLst>
+              <a:ext uri="{FF2B5EF4-FFF2-40B4-BE49-F238E27FC236}">
+                <a16:creationId xmlns:a16="http://schemas.microsoft.com/office/drawing/2014/main" id="{7E8AE835-9987-45AE-BB01-15318A37E3EC}"/>
+              </a:ext>
+            </a:extLst>
+          </p:cNvPr>
+          <p:cNvSpPr txBox="1">
+            <a:spLocks/>
+          </p:cNvSpPr>
+          <p:nvPr/>
+        </p:nvSpPr>
+        <p:spPr>
+          <a:xfrm>
+            <a:off x="1718377" y="4725229"/>
+            <a:ext cx="1358685" cy="481765"/>
+          </a:xfrm>
+          <a:prstGeom prst="rect">
+            <a:avLst/>
+          </a:prstGeom>
+        </p:spPr>
+        <p:txBody>
+          <a:bodyPr vert="horz" lIns="91440" tIns="45720" rIns="91440" bIns="45720" rtlCol="0">
+            <a:noAutofit/>
+          </a:bodyPr>
+          <a:lstStyle>
+            <a:lvl1pPr marL="0" indent="0" algn="ctr" defTabSz="914400" rtl="0" eaLnBrk="1" latinLnBrk="0" hangingPunct="1">
+              <a:lnSpc>
+                <a:spcPct val="90000"/>
+              </a:lnSpc>
+              <a:spcBef>
+                <a:spcPts val="1000"/>
+              </a:spcBef>
+              <a:buFont typeface="Arial"/>
+              <a:buNone/>
+              <a:defRPr sz="2400" kern="1200">
+                <a:solidFill>
+                  <a:schemeClr val="tx1"/>
+                </a:solidFill>
+                <a:latin typeface="+mn-lt"/>
+                <a:ea typeface="+mn-ea"/>
+                <a:cs typeface="+mn-cs"/>
+              </a:defRPr>
+            </a:lvl1pPr>
+            <a:lvl2pPr marL="457200" indent="0" algn="ctr" defTabSz="914400" rtl="0" eaLnBrk="1" latinLnBrk="0" hangingPunct="1">
+              <a:lnSpc>
+                <a:spcPct val="90000"/>
+              </a:lnSpc>
+              <a:spcBef>
+                <a:spcPts val="500"/>
+              </a:spcBef>
+              <a:buFont typeface="Arial"/>
+              <a:buNone/>
+              <a:defRPr sz="2000" kern="1200">
+                <a:solidFill>
+                  <a:schemeClr val="tx1"/>
+                </a:solidFill>
+                <a:latin typeface="+mn-lt"/>
+                <a:ea typeface="+mn-ea"/>
+                <a:cs typeface="+mn-cs"/>
+              </a:defRPr>
+            </a:lvl2pPr>
+            <a:lvl3pPr marL="914400" indent="0" algn="ctr" defTabSz="914400" rtl="0" eaLnBrk="1" latinLnBrk="0" hangingPunct="1">
+              <a:lnSpc>
+                <a:spcPct val="90000"/>
+              </a:lnSpc>
+              <a:spcBef>
+                <a:spcPts val="500"/>
+              </a:spcBef>
+              <a:buFont typeface="Arial"/>
+              <a:buNone/>
+              <a:defRPr sz="1800" kern="1200">
+                <a:solidFill>
+                  <a:schemeClr val="tx1"/>
+                </a:solidFill>
+                <a:latin typeface="+mn-lt"/>
+                <a:ea typeface="+mn-ea"/>
+                <a:cs typeface="+mn-cs"/>
+              </a:defRPr>
+            </a:lvl3pPr>
+            <a:lvl4pPr marL="1371600" indent="0" algn="ctr" defTabSz="914400" rtl="0" eaLnBrk="1" latinLnBrk="0" hangingPunct="1">
+              <a:lnSpc>
+                <a:spcPct val="90000"/>
+              </a:lnSpc>
+              <a:spcBef>
+                <a:spcPts val="500"/>
+              </a:spcBef>
+              <a:buFont typeface="Arial"/>
+              <a:buNone/>
+              <a:defRPr sz="1600" kern="1200">
+                <a:solidFill>
+                  <a:schemeClr val="tx1"/>
+                </a:solidFill>
+                <a:latin typeface="+mn-lt"/>
+                <a:ea typeface="+mn-ea"/>
+                <a:cs typeface="+mn-cs"/>
+              </a:defRPr>
+            </a:lvl4pPr>
+            <a:lvl5pPr marL="1828800" indent="0" algn="ctr" defTabSz="914400" rtl="0" eaLnBrk="1" latinLnBrk="0" hangingPunct="1">
+              <a:lnSpc>
+                <a:spcPct val="90000"/>
+              </a:lnSpc>
+              <a:spcBef>
+                <a:spcPts val="500"/>
+              </a:spcBef>
+              <a:buFont typeface="Arial"/>
+              <a:buNone/>
+              <a:defRPr sz="1600" kern="1200">
+                <a:solidFill>
+                  <a:schemeClr val="tx1"/>
+                </a:solidFill>
+                <a:latin typeface="+mn-lt"/>
+                <a:ea typeface="+mn-ea"/>
+                <a:cs typeface="+mn-cs"/>
+              </a:defRPr>
+            </a:lvl5pPr>
+            <a:lvl6pPr marL="2286000" indent="0" algn="ctr" defTabSz="914400" rtl="0" eaLnBrk="1" latinLnBrk="0" hangingPunct="1">
+              <a:lnSpc>
+                <a:spcPct val="90000"/>
+              </a:lnSpc>
+              <a:spcBef>
+                <a:spcPts val="500"/>
+              </a:spcBef>
+              <a:buFont typeface="Arial"/>
+              <a:buNone/>
+              <a:defRPr sz="1600" kern="1200">
+                <a:solidFill>
+                  <a:schemeClr val="tx1"/>
+                </a:solidFill>
+                <a:latin typeface="+mn-lt"/>
+                <a:ea typeface="+mn-ea"/>
+                <a:cs typeface="+mn-cs"/>
+              </a:defRPr>
+            </a:lvl6pPr>
+            <a:lvl7pPr marL="2743200" indent="0" algn="ctr" defTabSz="914400" rtl="0" eaLnBrk="1" latinLnBrk="0" hangingPunct="1">
+              <a:lnSpc>
+                <a:spcPct val="90000"/>
+              </a:lnSpc>
+              <a:spcBef>
+                <a:spcPts val="500"/>
+              </a:spcBef>
+              <a:buFont typeface="Arial"/>
+              <a:buNone/>
+              <a:defRPr sz="1600" kern="1200">
+                <a:solidFill>
+                  <a:schemeClr val="tx1"/>
+                </a:solidFill>
+                <a:latin typeface="+mn-lt"/>
+                <a:ea typeface="+mn-ea"/>
+                <a:cs typeface="+mn-cs"/>
+              </a:defRPr>
+            </a:lvl7pPr>
+            <a:lvl8pPr marL="3200400" indent="0" algn="ctr" defTabSz="914400" rtl="0" eaLnBrk="1" latinLnBrk="0" hangingPunct="1">
+              <a:lnSpc>
+                <a:spcPct val="90000"/>
+              </a:lnSpc>
+              <a:spcBef>
+                <a:spcPts val="500"/>
+              </a:spcBef>
+              <a:buFont typeface="Arial"/>
+              <a:buNone/>
+              <a:defRPr sz="1600" kern="1200">
+                <a:solidFill>
+                  <a:schemeClr val="tx1"/>
+                </a:solidFill>
+                <a:latin typeface="+mn-lt"/>
+                <a:ea typeface="+mn-ea"/>
+                <a:cs typeface="+mn-cs"/>
+              </a:defRPr>
+            </a:lvl8pPr>
+            <a:lvl9pPr marL="3657600" indent="0" algn="ctr" defTabSz="914400" rtl="0" eaLnBrk="1" latinLnBrk="0" hangingPunct="1">
+              <a:lnSpc>
+                <a:spcPct val="90000"/>
+              </a:lnSpc>
+              <a:spcBef>
+                <a:spcPts val="500"/>
+              </a:spcBef>
+              <a:buFont typeface="Arial"/>
+              <a:buNone/>
+              <a:defRPr sz="1600" kern="1200">
+                <a:solidFill>
+                  <a:schemeClr val="tx1"/>
+                </a:solidFill>
+                <a:latin typeface="+mn-lt"/>
+                <a:ea typeface="+mn-ea"/>
+                <a:cs typeface="+mn-cs"/>
+              </a:defRPr>
+            </a:lvl9pPr>
+          </a:lstStyle>
+          <a:p>
+            <a:r>
+              <a:rPr lang="en-US" sz="3600" b="1">
+                <a:solidFill>
+                  <a:srgbClr val="CC0000"/>
+                </a:solidFill>
+                <a:latin typeface="Arial" charset="0"/>
+                <a:ea typeface="Arial" charset="0"/>
+                <a:cs typeface="Arial" charset="0"/>
+              </a:rPr>
+              <a:t>91%</a:t>
+            </a:r>
+          </a:p>
+        </p:txBody>
+      </p:sp>
+      <p:sp>
+        <p:nvSpPr>
+          <p:cNvPr id="17" name="Subtitle 2">
+            <a:extLst>
+              <a:ext uri="{FF2B5EF4-FFF2-40B4-BE49-F238E27FC236}">
+                <a16:creationId xmlns:a16="http://schemas.microsoft.com/office/drawing/2014/main" id="{FAA16337-1F49-403E-A1FE-C31E0D0ADCF3}"/>
+              </a:ext>
+            </a:extLst>
+          </p:cNvPr>
+          <p:cNvSpPr txBox="1">
+            <a:spLocks/>
+          </p:cNvSpPr>
+          <p:nvPr/>
+        </p:nvSpPr>
+        <p:spPr>
+          <a:xfrm>
+            <a:off x="1324172" y="5270049"/>
+            <a:ext cx="2147095" cy="562965"/>
+          </a:xfrm>
+          <a:prstGeom prst="rect">
+            <a:avLst/>
+          </a:prstGeom>
+        </p:spPr>
+        <p:txBody>
+          <a:bodyPr vert="horz" lIns="91440" tIns="45720" rIns="91440" bIns="45720" rtlCol="0">
+            <a:normAutofit/>
+          </a:bodyPr>
+          <a:lstStyle>
+            <a:lvl1pPr marL="0" indent="0" algn="ctr" defTabSz="914400" rtl="0" eaLnBrk="1" latinLnBrk="0" hangingPunct="1">
+              <a:lnSpc>
+                <a:spcPct val="90000"/>
+              </a:lnSpc>
+              <a:spcBef>
+                <a:spcPts val="1000"/>
+              </a:spcBef>
+              <a:buFont typeface="Arial"/>
+              <a:buNone/>
+              <a:defRPr sz="2400" kern="1200">
+                <a:solidFill>
+                  <a:schemeClr val="tx1"/>
+                </a:solidFill>
+                <a:latin typeface="+mn-lt"/>
+                <a:ea typeface="+mn-ea"/>
+                <a:cs typeface="+mn-cs"/>
+              </a:defRPr>
+            </a:lvl1pPr>
+            <a:lvl2pPr marL="457200" indent="0" algn="ctr" defTabSz="914400" rtl="0" eaLnBrk="1" latinLnBrk="0" hangingPunct="1">
+              <a:lnSpc>
+                <a:spcPct val="90000"/>
+              </a:lnSpc>
+              <a:spcBef>
+                <a:spcPts val="500"/>
+              </a:spcBef>
+              <a:buFont typeface="Arial"/>
+              <a:buNone/>
+              <a:defRPr sz="2000" kern="1200">
+                <a:solidFill>
+                  <a:schemeClr val="tx1"/>
+                </a:solidFill>
+                <a:latin typeface="+mn-lt"/>
+                <a:ea typeface="+mn-ea"/>
+                <a:cs typeface="+mn-cs"/>
+              </a:defRPr>
+            </a:lvl2pPr>
+            <a:lvl3pPr marL="914400" indent="0" algn="ctr" defTabSz="914400" rtl="0" eaLnBrk="1" latinLnBrk="0" hangingPunct="1">
+              <a:lnSpc>
+                <a:spcPct val="90000"/>
+              </a:lnSpc>
+              <a:spcBef>
+                <a:spcPts val="500"/>
+              </a:spcBef>
+              <a:buFont typeface="Arial"/>
+              <a:buNone/>
+              <a:defRPr sz="1800" kern="1200">
+                <a:solidFill>
+                  <a:schemeClr val="tx1"/>
+                </a:solidFill>
+                <a:latin typeface="+mn-lt"/>
+                <a:ea typeface="+mn-ea"/>
+                <a:cs typeface="+mn-cs"/>
+              </a:defRPr>
+            </a:lvl3pPr>
+            <a:lvl4pPr marL="1371600" indent="0" algn="ctr" defTabSz="914400" rtl="0" eaLnBrk="1" latinLnBrk="0" hangingPunct="1">
+              <a:lnSpc>
+                <a:spcPct val="90000"/>
+              </a:lnSpc>
+              <a:spcBef>
+                <a:spcPts val="500"/>
+              </a:spcBef>
+              <a:buFont typeface="Arial"/>
+              <a:buNone/>
+              <a:defRPr sz="1600" kern="1200">
+                <a:solidFill>
+                  <a:schemeClr val="tx1"/>
+                </a:solidFill>
+                <a:latin typeface="+mn-lt"/>
+                <a:ea typeface="+mn-ea"/>
+                <a:cs typeface="+mn-cs"/>
+              </a:defRPr>
+            </a:lvl4pPr>
+            <a:lvl5pPr marL="1828800" indent="0" algn="ctr" defTabSz="914400" rtl="0" eaLnBrk="1" latinLnBrk="0" hangingPunct="1">
+              <a:lnSpc>
+                <a:spcPct val="90000"/>
+              </a:lnSpc>
+              <a:spcBef>
+                <a:spcPts val="500"/>
+              </a:spcBef>
+              <a:buFont typeface="Arial"/>
+              <a:buNone/>
+              <a:defRPr sz="1600" kern="1200">
+                <a:solidFill>
+                  <a:schemeClr val="tx1"/>
+                </a:solidFill>
+                <a:latin typeface="+mn-lt"/>
+                <a:ea typeface="+mn-ea"/>
+                <a:cs typeface="+mn-cs"/>
+              </a:defRPr>
+            </a:lvl5pPr>
+            <a:lvl6pPr marL="2286000" indent="0" algn="ctr" defTabSz="914400" rtl="0" eaLnBrk="1" latinLnBrk="0" hangingPunct="1">
+              <a:lnSpc>
+                <a:spcPct val="90000"/>
+              </a:lnSpc>
+              <a:spcBef>
+                <a:spcPts val="500"/>
+              </a:spcBef>
+              <a:buFont typeface="Arial"/>
+              <a:buNone/>
+              <a:defRPr sz="1600" kern="1200">
+                <a:solidFill>
+                  <a:schemeClr val="tx1"/>
+                </a:solidFill>
+                <a:latin typeface="+mn-lt"/>
+                <a:ea typeface="+mn-ea"/>
+                <a:cs typeface="+mn-cs"/>
+              </a:defRPr>
+            </a:lvl6pPr>
+            <a:lvl7pPr marL="2743200" indent="0" algn="ctr" defTabSz="914400" rtl="0" eaLnBrk="1" latinLnBrk="0" hangingPunct="1">
+              <a:lnSpc>
+                <a:spcPct val="90000"/>
+              </a:lnSpc>
+              <a:spcBef>
+                <a:spcPts val="500"/>
+              </a:spcBef>
+              <a:buFont typeface="Arial"/>
+              <a:buNone/>
+              <a:defRPr sz="1600" kern="1200">
+                <a:solidFill>
+                  <a:schemeClr val="tx1"/>
+                </a:solidFill>
+                <a:latin typeface="+mn-lt"/>
+                <a:ea typeface="+mn-ea"/>
+                <a:cs typeface="+mn-cs"/>
+              </a:defRPr>
+            </a:lvl7pPr>
+            <a:lvl8pPr marL="3200400" indent="0" algn="ctr" defTabSz="914400" rtl="0" eaLnBrk="1" latinLnBrk="0" hangingPunct="1">
+              <a:lnSpc>
+                <a:spcPct val="90000"/>
+              </a:lnSpc>
+              <a:spcBef>
+                <a:spcPts val="500"/>
+              </a:spcBef>
+              <a:buFont typeface="Arial"/>
+              <a:buNone/>
+              <a:defRPr sz="1600" kern="1200">
+                <a:solidFill>
+                  <a:schemeClr val="tx1"/>
+                </a:solidFill>
+                <a:latin typeface="+mn-lt"/>
+                <a:ea typeface="+mn-ea"/>
+                <a:cs typeface="+mn-cs"/>
+              </a:defRPr>
+            </a:lvl8pPr>
+            <a:lvl9pPr marL="3657600" indent="0" algn="ctr" defTabSz="914400" rtl="0" eaLnBrk="1" latinLnBrk="0" hangingPunct="1">
+              <a:lnSpc>
+                <a:spcPct val="90000"/>
+              </a:lnSpc>
+              <a:spcBef>
+                <a:spcPts val="500"/>
+              </a:spcBef>
+              <a:buFont typeface="Arial"/>
+              <a:buNone/>
+              <a:defRPr sz="1600" kern="1200">
+                <a:solidFill>
+                  <a:schemeClr val="tx1"/>
+                </a:solidFill>
+                <a:latin typeface="+mn-lt"/>
+                <a:ea typeface="+mn-ea"/>
+                <a:cs typeface="+mn-cs"/>
+              </a:defRPr>
+            </a:lvl9pPr>
+          </a:lstStyle>
+          <a:p>
+            <a:r>
+              <a:rPr lang="en-US" sz="1400">
+                <a:latin typeface="Arial" charset="0"/>
+                <a:ea typeface="Arial" charset="0"/>
+                <a:cs typeface="Arial" charset="0"/>
+              </a:rPr>
+              <a:t>of the Fortune 100 use our tools</a:t>
+            </a:r>
+          </a:p>
+        </p:txBody>
+      </p:sp>
+      <p:sp>
+        <p:nvSpPr>
+          <p:cNvPr id="19" name="Subtitle 2">
+            <a:extLst>
+              <a:ext uri="{FF2B5EF4-FFF2-40B4-BE49-F238E27FC236}">
+                <a16:creationId xmlns:a16="http://schemas.microsoft.com/office/drawing/2014/main" id="{BDB30440-BC20-49DD-8A58-2DBD9EB44CE8}"/>
+              </a:ext>
+            </a:extLst>
+          </p:cNvPr>
+          <p:cNvSpPr txBox="1">
+            <a:spLocks/>
+          </p:cNvSpPr>
+          <p:nvPr/>
+        </p:nvSpPr>
+        <p:spPr>
+          <a:xfrm>
+            <a:off x="4151870" y="4769096"/>
+            <a:ext cx="1358685" cy="481765"/>
+          </a:xfrm>
+          <a:prstGeom prst="rect">
+            <a:avLst/>
+          </a:prstGeom>
+        </p:spPr>
+        <p:txBody>
+          <a:bodyPr vert="horz" lIns="91440" tIns="45720" rIns="91440" bIns="45720" rtlCol="0">
+            <a:noAutofit/>
+          </a:bodyPr>
+          <a:lstStyle>
+            <a:lvl1pPr marL="0" indent="0" algn="ctr" defTabSz="914400" rtl="0" eaLnBrk="1" latinLnBrk="0" hangingPunct="1">
+              <a:lnSpc>
+                <a:spcPct val="90000"/>
+              </a:lnSpc>
+              <a:spcBef>
+                <a:spcPts val="1000"/>
+              </a:spcBef>
+              <a:buFont typeface="Arial"/>
+              <a:buNone/>
+              <a:defRPr sz="2400" kern="1200">
+                <a:solidFill>
+                  <a:schemeClr val="tx1"/>
+                </a:solidFill>
+                <a:latin typeface="+mn-lt"/>
+                <a:ea typeface="+mn-ea"/>
+                <a:cs typeface="+mn-cs"/>
+              </a:defRPr>
+            </a:lvl1pPr>
+            <a:lvl2pPr marL="457200" indent="0" algn="ctr" defTabSz="914400" rtl="0" eaLnBrk="1" latinLnBrk="0" hangingPunct="1">
+              <a:lnSpc>
+                <a:spcPct val="90000"/>
+              </a:lnSpc>
+              <a:spcBef>
+                <a:spcPts val="500"/>
+              </a:spcBef>
+              <a:buFont typeface="Arial"/>
+              <a:buNone/>
+              <a:defRPr sz="2000" kern="1200">
+                <a:solidFill>
+                  <a:schemeClr val="tx1"/>
+                </a:solidFill>
+                <a:latin typeface="+mn-lt"/>
+                <a:ea typeface="+mn-ea"/>
+                <a:cs typeface="+mn-cs"/>
+              </a:defRPr>
+            </a:lvl2pPr>
+            <a:lvl3pPr marL="914400" indent="0" algn="ctr" defTabSz="914400" rtl="0" eaLnBrk="1" latinLnBrk="0" hangingPunct="1">
+              <a:lnSpc>
+                <a:spcPct val="90000"/>
+              </a:lnSpc>
+              <a:spcBef>
+                <a:spcPts val="500"/>
+              </a:spcBef>
+              <a:buFont typeface="Arial"/>
+              <a:buNone/>
+              <a:defRPr sz="1800" kern="1200">
+                <a:solidFill>
+                  <a:schemeClr val="tx1"/>
+                </a:solidFill>
+                <a:latin typeface="+mn-lt"/>
+                <a:ea typeface="+mn-ea"/>
+                <a:cs typeface="+mn-cs"/>
+              </a:defRPr>
+            </a:lvl3pPr>
+            <a:lvl4pPr marL="1371600" indent="0" algn="ctr" defTabSz="914400" rtl="0" eaLnBrk="1" latinLnBrk="0" hangingPunct="1">
+              <a:lnSpc>
+                <a:spcPct val="90000"/>
+              </a:lnSpc>
+              <a:spcBef>
+                <a:spcPts val="500"/>
+              </a:spcBef>
+              <a:buFont typeface="Arial"/>
+              <a:buNone/>
+              <a:defRPr sz="1600" kern="1200">
+                <a:solidFill>
+                  <a:schemeClr val="tx1"/>
+                </a:solidFill>
+                <a:latin typeface="+mn-lt"/>
+                <a:ea typeface="+mn-ea"/>
+                <a:cs typeface="+mn-cs"/>
+              </a:defRPr>
+            </a:lvl4pPr>
+            <a:lvl5pPr marL="1828800" indent="0" algn="ctr" defTabSz="914400" rtl="0" eaLnBrk="1" latinLnBrk="0" hangingPunct="1">
+              <a:lnSpc>
+                <a:spcPct val="90000"/>
+              </a:lnSpc>
+              <a:spcBef>
+                <a:spcPts val="500"/>
+              </a:spcBef>
+              <a:buFont typeface="Arial"/>
+              <a:buNone/>
+              <a:defRPr sz="1600" kern="1200">
+                <a:solidFill>
+                  <a:schemeClr val="tx1"/>
+                </a:solidFill>
+                <a:latin typeface="+mn-lt"/>
+                <a:ea typeface="+mn-ea"/>
+                <a:cs typeface="+mn-cs"/>
+              </a:defRPr>
+            </a:lvl5pPr>
+            <a:lvl6pPr marL="2286000" indent="0" algn="ctr" defTabSz="914400" rtl="0" eaLnBrk="1" latinLnBrk="0" hangingPunct="1">
+              <a:lnSpc>
+                <a:spcPct val="90000"/>
+              </a:lnSpc>
+              <a:spcBef>
+                <a:spcPts val="500"/>
+              </a:spcBef>
+              <a:buFont typeface="Arial"/>
+              <a:buNone/>
+              <a:defRPr sz="1600" kern="1200">
+                <a:solidFill>
+                  <a:schemeClr val="tx1"/>
+                </a:solidFill>
+                <a:latin typeface="+mn-lt"/>
+                <a:ea typeface="+mn-ea"/>
+                <a:cs typeface="+mn-cs"/>
+              </a:defRPr>
+            </a:lvl6pPr>
+            <a:lvl7pPr marL="2743200" indent="0" algn="ctr" defTabSz="914400" rtl="0" eaLnBrk="1" latinLnBrk="0" hangingPunct="1">
+              <a:lnSpc>
+                <a:spcPct val="90000"/>
+              </a:lnSpc>
+              <a:spcBef>
+                <a:spcPts val="500"/>
+              </a:spcBef>
+              <a:buFont typeface="Arial"/>
+              <a:buNone/>
+              <a:defRPr sz="1600" kern="1200">
+                <a:solidFill>
+                  <a:schemeClr val="tx1"/>
+                </a:solidFill>
+                <a:latin typeface="+mn-lt"/>
+                <a:ea typeface="+mn-ea"/>
+                <a:cs typeface="+mn-cs"/>
+              </a:defRPr>
+            </a:lvl7pPr>
+            <a:lvl8pPr marL="3200400" indent="0" algn="ctr" defTabSz="914400" rtl="0" eaLnBrk="1" latinLnBrk="0" hangingPunct="1">
+              <a:lnSpc>
+                <a:spcPct val="90000"/>
+              </a:lnSpc>
+              <a:spcBef>
+                <a:spcPts val="500"/>
+              </a:spcBef>
+              <a:buFont typeface="Arial"/>
+              <a:buNone/>
+              <a:defRPr sz="1600" kern="1200">
+                <a:solidFill>
+                  <a:schemeClr val="tx1"/>
+                </a:solidFill>
+                <a:latin typeface="+mn-lt"/>
+                <a:ea typeface="+mn-ea"/>
+                <a:cs typeface="+mn-cs"/>
+              </a:defRPr>
+            </a:lvl8pPr>
+            <a:lvl9pPr marL="3657600" indent="0" algn="ctr" defTabSz="914400" rtl="0" eaLnBrk="1" latinLnBrk="0" hangingPunct="1">
+              <a:lnSpc>
+                <a:spcPct val="90000"/>
+              </a:lnSpc>
+              <a:spcBef>
+                <a:spcPts val="500"/>
+              </a:spcBef>
+              <a:buFont typeface="Arial"/>
+              <a:buNone/>
+              <a:defRPr sz="1600" kern="1200">
+                <a:solidFill>
+                  <a:schemeClr val="tx1"/>
+                </a:solidFill>
+                <a:latin typeface="+mn-lt"/>
+                <a:ea typeface="+mn-ea"/>
+                <a:cs typeface="+mn-cs"/>
+              </a:defRPr>
+            </a:lvl9pPr>
+          </a:lstStyle>
+          <a:p>
+            <a:r>
+              <a:rPr lang="en-US" sz="3600" b="1" dirty="0">
+                <a:solidFill>
+                  <a:srgbClr val="CC0000"/>
+                </a:solidFill>
+                <a:latin typeface="Arial" charset="0"/>
+                <a:ea typeface="Arial" charset="0"/>
+                <a:cs typeface="Arial" charset="0"/>
+              </a:rPr>
+              <a:t>6m</a:t>
+            </a:r>
+          </a:p>
+        </p:txBody>
+      </p:sp>
+      <p:sp>
+        <p:nvSpPr>
+          <p:cNvPr id="20" name="Subtitle 2">
+            <a:extLst>
+              <a:ext uri="{FF2B5EF4-FFF2-40B4-BE49-F238E27FC236}">
+                <a16:creationId xmlns:a16="http://schemas.microsoft.com/office/drawing/2014/main" id="{9BE42599-D7F9-44EC-B902-28CD4AE4FCDF}"/>
+              </a:ext>
+            </a:extLst>
+          </p:cNvPr>
+          <p:cNvSpPr txBox="1">
+            <a:spLocks/>
+          </p:cNvSpPr>
+          <p:nvPr/>
+        </p:nvSpPr>
+        <p:spPr>
+          <a:xfrm>
+            <a:off x="3757665" y="5313916"/>
+            <a:ext cx="2147095" cy="562965"/>
+          </a:xfrm>
+          <a:prstGeom prst="rect">
+            <a:avLst/>
+          </a:prstGeom>
+        </p:spPr>
+        <p:txBody>
+          <a:bodyPr vert="horz" lIns="91440" tIns="45720" rIns="91440" bIns="45720" rtlCol="0">
+            <a:normAutofit/>
+          </a:bodyPr>
+          <a:lstStyle>
+            <a:lvl1pPr marL="0" indent="0" algn="ctr" defTabSz="914400" rtl="0" eaLnBrk="1" latinLnBrk="0" hangingPunct="1">
+              <a:lnSpc>
+                <a:spcPct val="90000"/>
+              </a:lnSpc>
+              <a:spcBef>
+                <a:spcPts val="1000"/>
+              </a:spcBef>
+              <a:buFont typeface="Arial"/>
+              <a:buNone/>
+              <a:defRPr sz="2400" kern="1200">
+                <a:solidFill>
+                  <a:schemeClr val="tx1"/>
+                </a:solidFill>
+                <a:latin typeface="+mn-lt"/>
+                <a:ea typeface="+mn-ea"/>
+                <a:cs typeface="+mn-cs"/>
+              </a:defRPr>
+            </a:lvl1pPr>
+            <a:lvl2pPr marL="457200" indent="0" algn="ctr" defTabSz="914400" rtl="0" eaLnBrk="1" latinLnBrk="0" hangingPunct="1">
+              <a:lnSpc>
+                <a:spcPct val="90000"/>
+              </a:lnSpc>
+              <a:spcBef>
+                <a:spcPts val="500"/>
+              </a:spcBef>
+              <a:buFont typeface="Arial"/>
+              <a:buNone/>
+              <a:defRPr sz="2000" kern="1200">
+                <a:solidFill>
+                  <a:schemeClr val="tx1"/>
+                </a:solidFill>
+                <a:latin typeface="+mn-lt"/>
+                <a:ea typeface="+mn-ea"/>
+                <a:cs typeface="+mn-cs"/>
+              </a:defRPr>
+            </a:lvl2pPr>
+            <a:lvl3pPr marL="914400" indent="0" algn="ctr" defTabSz="914400" rtl="0" eaLnBrk="1" latinLnBrk="0" hangingPunct="1">
+              <a:lnSpc>
+                <a:spcPct val="90000"/>
+              </a:lnSpc>
+              <a:spcBef>
+                <a:spcPts val="500"/>
+              </a:spcBef>
+              <a:buFont typeface="Arial"/>
+              <a:buNone/>
+              <a:defRPr sz="1800" kern="1200">
+                <a:solidFill>
+                  <a:schemeClr val="tx1"/>
+                </a:solidFill>
+                <a:latin typeface="+mn-lt"/>
+                <a:ea typeface="+mn-ea"/>
+                <a:cs typeface="+mn-cs"/>
+              </a:defRPr>
+            </a:lvl3pPr>
+            <a:lvl4pPr marL="1371600" indent="0" algn="ctr" defTabSz="914400" rtl="0" eaLnBrk="1" latinLnBrk="0" hangingPunct="1">
+              <a:lnSpc>
+                <a:spcPct val="90000"/>
+              </a:lnSpc>
+              <a:spcBef>
+                <a:spcPts val="500"/>
+              </a:spcBef>
+              <a:buFont typeface="Arial"/>
+              <a:buNone/>
+              <a:defRPr sz="1600" kern="1200">
+                <a:solidFill>
+                  <a:schemeClr val="tx1"/>
+                </a:solidFill>
+                <a:latin typeface="+mn-lt"/>
+                <a:ea typeface="+mn-ea"/>
+                <a:cs typeface="+mn-cs"/>
+              </a:defRPr>
+            </a:lvl4pPr>
+            <a:lvl5pPr marL="1828800" indent="0" algn="ctr" defTabSz="914400" rtl="0" eaLnBrk="1" latinLnBrk="0" hangingPunct="1">
+              <a:lnSpc>
+                <a:spcPct val="90000"/>
+              </a:lnSpc>
+              <a:spcBef>
+                <a:spcPts val="500"/>
+              </a:spcBef>
+              <a:buFont typeface="Arial"/>
+              <a:buNone/>
+              <a:defRPr sz="1600" kern="1200">
+                <a:solidFill>
+                  <a:schemeClr val="tx1"/>
+                </a:solidFill>
+                <a:latin typeface="+mn-lt"/>
+                <a:ea typeface="+mn-ea"/>
+                <a:cs typeface="+mn-cs"/>
+              </a:defRPr>
+            </a:lvl5pPr>
+            <a:lvl6pPr marL="2286000" indent="0" algn="ctr" defTabSz="914400" rtl="0" eaLnBrk="1" latinLnBrk="0" hangingPunct="1">
+              <a:lnSpc>
+                <a:spcPct val="90000"/>
+              </a:lnSpc>
+              <a:spcBef>
+                <a:spcPts val="500"/>
+              </a:spcBef>
+              <a:buFont typeface="Arial"/>
+              <a:buNone/>
+              <a:defRPr sz="1600" kern="1200">
+                <a:solidFill>
+                  <a:schemeClr val="tx1"/>
+                </a:solidFill>
+                <a:latin typeface="+mn-lt"/>
+                <a:ea typeface="+mn-ea"/>
+                <a:cs typeface="+mn-cs"/>
+              </a:defRPr>
+            </a:lvl6pPr>
+            <a:lvl7pPr marL="2743200" indent="0" algn="ctr" defTabSz="914400" rtl="0" eaLnBrk="1" latinLnBrk="0" hangingPunct="1">
+              <a:lnSpc>
+                <a:spcPct val="90000"/>
+              </a:lnSpc>
+              <a:spcBef>
+                <a:spcPts val="500"/>
+              </a:spcBef>
+              <a:buFont typeface="Arial"/>
+              <a:buNone/>
+              <a:defRPr sz="1600" kern="1200">
+                <a:solidFill>
+                  <a:schemeClr val="tx1"/>
+                </a:solidFill>
+                <a:latin typeface="+mn-lt"/>
+                <a:ea typeface="+mn-ea"/>
+                <a:cs typeface="+mn-cs"/>
+              </a:defRPr>
+            </a:lvl7pPr>
+            <a:lvl8pPr marL="3200400" indent="0" algn="ctr" defTabSz="914400" rtl="0" eaLnBrk="1" latinLnBrk="0" hangingPunct="1">
+              <a:lnSpc>
+                <a:spcPct val="90000"/>
+              </a:lnSpc>
+              <a:spcBef>
+                <a:spcPts val="500"/>
+              </a:spcBef>
+              <a:buFont typeface="Arial"/>
+              <a:buNone/>
+              <a:defRPr sz="1600" kern="1200">
+                <a:solidFill>
+                  <a:schemeClr val="tx1"/>
+                </a:solidFill>
+                <a:latin typeface="+mn-lt"/>
+                <a:ea typeface="+mn-ea"/>
+                <a:cs typeface="+mn-cs"/>
+              </a:defRPr>
+            </a:lvl8pPr>
+            <a:lvl9pPr marL="3657600" indent="0" algn="ctr" defTabSz="914400" rtl="0" eaLnBrk="1" latinLnBrk="0" hangingPunct="1">
+              <a:lnSpc>
+                <a:spcPct val="90000"/>
+              </a:lnSpc>
+              <a:spcBef>
+                <a:spcPts val="500"/>
+              </a:spcBef>
+              <a:buFont typeface="Arial"/>
+              <a:buNone/>
+              <a:defRPr sz="1600" kern="1200">
+                <a:solidFill>
+                  <a:schemeClr val="tx1"/>
+                </a:solidFill>
+                <a:latin typeface="+mn-lt"/>
+                <a:ea typeface="+mn-ea"/>
+                <a:cs typeface="+mn-cs"/>
+              </a:defRPr>
+            </a:lvl9pPr>
+          </a:lstStyle>
+          <a:p>
+            <a:r>
+              <a:rPr lang="en-US" sz="1400">
+                <a:latin typeface="Arial" charset="0"/>
+                <a:ea typeface="Arial" charset="0"/>
+                <a:cs typeface="Arial" charset="0"/>
+              </a:rPr>
+              <a:t>website visits each year</a:t>
+            </a:r>
+          </a:p>
+        </p:txBody>
+      </p:sp>
+      <p:sp>
+        <p:nvSpPr>
+          <p:cNvPr id="22" name="Subtitle 2">
+            <a:extLst>
+              <a:ext uri="{FF2B5EF4-FFF2-40B4-BE49-F238E27FC236}">
+                <a16:creationId xmlns:a16="http://schemas.microsoft.com/office/drawing/2014/main" id="{F531CBC8-8528-4A8A-8AE5-058E05778AFF}"/>
+              </a:ext>
+            </a:extLst>
+          </p:cNvPr>
+          <p:cNvSpPr txBox="1">
+            <a:spLocks/>
+          </p:cNvSpPr>
+          <p:nvPr/>
+        </p:nvSpPr>
+        <p:spPr>
+          <a:xfrm>
+            <a:off x="6657011" y="4769096"/>
+            <a:ext cx="1358685" cy="481765"/>
+          </a:xfrm>
+          <a:prstGeom prst="rect">
+            <a:avLst/>
+          </a:prstGeom>
+        </p:spPr>
+        <p:txBody>
+          <a:bodyPr vert="horz" lIns="91440" tIns="45720" rIns="91440" bIns="45720" rtlCol="0">
+            <a:noAutofit/>
+          </a:bodyPr>
+          <a:lstStyle>
+            <a:lvl1pPr marL="0" indent="0" algn="ctr" defTabSz="914400" rtl="0" eaLnBrk="1" latinLnBrk="0" hangingPunct="1">
+              <a:lnSpc>
+                <a:spcPct val="90000"/>
+              </a:lnSpc>
+              <a:spcBef>
+                <a:spcPts val="1000"/>
+              </a:spcBef>
+              <a:buFont typeface="Arial"/>
+              <a:buNone/>
+              <a:defRPr sz="2400" kern="1200">
+                <a:solidFill>
+                  <a:schemeClr val="tx1"/>
+                </a:solidFill>
+                <a:latin typeface="+mn-lt"/>
+                <a:ea typeface="+mn-ea"/>
+                <a:cs typeface="+mn-cs"/>
+              </a:defRPr>
+            </a:lvl1pPr>
+            <a:lvl2pPr marL="457200" indent="0" algn="ctr" defTabSz="914400" rtl="0" eaLnBrk="1" latinLnBrk="0" hangingPunct="1">
+              <a:lnSpc>
+                <a:spcPct val="90000"/>
+              </a:lnSpc>
+              <a:spcBef>
+                <a:spcPts val="500"/>
+              </a:spcBef>
+              <a:buFont typeface="Arial"/>
+              <a:buNone/>
+              <a:defRPr sz="2000" kern="1200">
+                <a:solidFill>
+                  <a:schemeClr val="tx1"/>
+                </a:solidFill>
+                <a:latin typeface="+mn-lt"/>
+                <a:ea typeface="+mn-ea"/>
+                <a:cs typeface="+mn-cs"/>
+              </a:defRPr>
+            </a:lvl2pPr>
+            <a:lvl3pPr marL="914400" indent="0" algn="ctr" defTabSz="914400" rtl="0" eaLnBrk="1" latinLnBrk="0" hangingPunct="1">
+              <a:lnSpc>
+                <a:spcPct val="90000"/>
+              </a:lnSpc>
+              <a:spcBef>
+                <a:spcPts val="500"/>
+              </a:spcBef>
+              <a:buFont typeface="Arial"/>
+              <a:buNone/>
+              <a:defRPr sz="1800" kern="1200">
+                <a:solidFill>
+                  <a:schemeClr val="tx1"/>
+                </a:solidFill>
+                <a:latin typeface="+mn-lt"/>
+                <a:ea typeface="+mn-ea"/>
+                <a:cs typeface="+mn-cs"/>
+              </a:defRPr>
+            </a:lvl3pPr>
+            <a:lvl4pPr marL="1371600" indent="0" algn="ctr" defTabSz="914400" rtl="0" eaLnBrk="1" latinLnBrk="0" hangingPunct="1">
+              <a:lnSpc>
+                <a:spcPct val="90000"/>
+              </a:lnSpc>
+              <a:spcBef>
+                <a:spcPts val="500"/>
+              </a:spcBef>
+              <a:buFont typeface="Arial"/>
+              <a:buNone/>
+              <a:defRPr sz="1600" kern="1200">
+                <a:solidFill>
+                  <a:schemeClr val="tx1"/>
+                </a:solidFill>
+                <a:latin typeface="+mn-lt"/>
+                <a:ea typeface="+mn-ea"/>
+                <a:cs typeface="+mn-cs"/>
+              </a:defRPr>
+            </a:lvl4pPr>
+            <a:lvl5pPr marL="1828800" indent="0" algn="ctr" defTabSz="914400" rtl="0" eaLnBrk="1" latinLnBrk="0" hangingPunct="1">
+              <a:lnSpc>
+                <a:spcPct val="90000"/>
+              </a:lnSpc>
+              <a:spcBef>
+                <a:spcPts val="500"/>
+              </a:spcBef>
+              <a:buFont typeface="Arial"/>
+              <a:buNone/>
+              <a:defRPr sz="1600" kern="1200">
+                <a:solidFill>
+                  <a:schemeClr val="tx1"/>
+                </a:solidFill>
+                <a:latin typeface="+mn-lt"/>
+                <a:ea typeface="+mn-ea"/>
+                <a:cs typeface="+mn-cs"/>
+              </a:defRPr>
+            </a:lvl5pPr>
+            <a:lvl6pPr marL="2286000" indent="0" algn="ctr" defTabSz="914400" rtl="0" eaLnBrk="1" latinLnBrk="0" hangingPunct="1">
+              <a:lnSpc>
+                <a:spcPct val="90000"/>
+              </a:lnSpc>
+              <a:spcBef>
+                <a:spcPts val="500"/>
+              </a:spcBef>
+              <a:buFont typeface="Arial"/>
+              <a:buNone/>
+              <a:defRPr sz="1600" kern="1200">
+                <a:solidFill>
+                  <a:schemeClr val="tx1"/>
+                </a:solidFill>
+                <a:latin typeface="+mn-lt"/>
+                <a:ea typeface="+mn-ea"/>
+                <a:cs typeface="+mn-cs"/>
+              </a:defRPr>
+            </a:lvl6pPr>
+            <a:lvl7pPr marL="2743200" indent="0" algn="ctr" defTabSz="914400" rtl="0" eaLnBrk="1" latinLnBrk="0" hangingPunct="1">
+              <a:lnSpc>
+                <a:spcPct val="90000"/>
+              </a:lnSpc>
+              <a:spcBef>
+                <a:spcPts val="500"/>
+              </a:spcBef>
+              <a:buFont typeface="Arial"/>
+              <a:buNone/>
+              <a:defRPr sz="1600" kern="1200">
+                <a:solidFill>
+                  <a:schemeClr val="tx1"/>
+                </a:solidFill>
+                <a:latin typeface="+mn-lt"/>
+                <a:ea typeface="+mn-ea"/>
+                <a:cs typeface="+mn-cs"/>
+              </a:defRPr>
+            </a:lvl7pPr>
+            <a:lvl8pPr marL="3200400" indent="0" algn="ctr" defTabSz="914400" rtl="0" eaLnBrk="1" latinLnBrk="0" hangingPunct="1">
+              <a:lnSpc>
+                <a:spcPct val="90000"/>
+              </a:lnSpc>
+              <a:spcBef>
+                <a:spcPts val="500"/>
+              </a:spcBef>
+              <a:buFont typeface="Arial"/>
+              <a:buNone/>
+              <a:defRPr sz="1600" kern="1200">
+                <a:solidFill>
+                  <a:schemeClr val="tx1"/>
+                </a:solidFill>
+                <a:latin typeface="+mn-lt"/>
+                <a:ea typeface="+mn-ea"/>
+                <a:cs typeface="+mn-cs"/>
+              </a:defRPr>
+            </a:lvl8pPr>
+            <a:lvl9pPr marL="3657600" indent="0" algn="ctr" defTabSz="914400" rtl="0" eaLnBrk="1" latinLnBrk="0" hangingPunct="1">
+              <a:lnSpc>
+                <a:spcPct val="90000"/>
+              </a:lnSpc>
+              <a:spcBef>
+                <a:spcPts val="500"/>
+              </a:spcBef>
+              <a:buFont typeface="Arial"/>
+              <a:buNone/>
+              <a:defRPr sz="1600" kern="1200">
+                <a:solidFill>
+                  <a:schemeClr val="tx1"/>
+                </a:solidFill>
+                <a:latin typeface="+mn-lt"/>
+                <a:ea typeface="+mn-ea"/>
+                <a:cs typeface="+mn-cs"/>
+              </a:defRPr>
+            </a:lvl9pPr>
+          </a:lstStyle>
+          <a:p>
+            <a:r>
+              <a:rPr lang="en-US" sz="3600" b="1" dirty="0">
+                <a:solidFill>
+                  <a:srgbClr val="CC0000"/>
+                </a:solidFill>
+                <a:latin typeface="Arial" charset="0"/>
+                <a:ea typeface="Arial" charset="0"/>
+                <a:cs typeface="Arial" charset="0"/>
+              </a:rPr>
+              <a:t>1286</a:t>
+            </a:r>
+          </a:p>
+        </p:txBody>
+      </p:sp>
+      <p:sp>
+        <p:nvSpPr>
+          <p:cNvPr id="23" name="Subtitle 2">
+            <a:extLst>
+              <a:ext uri="{FF2B5EF4-FFF2-40B4-BE49-F238E27FC236}">
+                <a16:creationId xmlns:a16="http://schemas.microsoft.com/office/drawing/2014/main" id="{789BDF5F-CBF6-44AB-8D42-694C657D0779}"/>
+              </a:ext>
+            </a:extLst>
+          </p:cNvPr>
+          <p:cNvSpPr txBox="1">
+            <a:spLocks/>
+          </p:cNvSpPr>
+          <p:nvPr/>
+        </p:nvSpPr>
+        <p:spPr>
+          <a:xfrm>
+            <a:off x="6262806" y="5313916"/>
+            <a:ext cx="2147095" cy="562965"/>
+          </a:xfrm>
+          <a:prstGeom prst="rect">
+            <a:avLst/>
+          </a:prstGeom>
+        </p:spPr>
+        <p:txBody>
+          <a:bodyPr vert="horz" lIns="91440" tIns="45720" rIns="91440" bIns="45720" rtlCol="0">
+            <a:normAutofit/>
+          </a:bodyPr>
+          <a:lstStyle>
+            <a:lvl1pPr marL="0" indent="0" algn="ctr" defTabSz="914400" rtl="0" eaLnBrk="1" latinLnBrk="0" hangingPunct="1">
+              <a:lnSpc>
+                <a:spcPct val="90000"/>
+              </a:lnSpc>
+              <a:spcBef>
+                <a:spcPts val="1000"/>
+              </a:spcBef>
+              <a:buFont typeface="Arial"/>
+              <a:buNone/>
+              <a:defRPr sz="2400" kern="1200">
+                <a:solidFill>
+                  <a:schemeClr val="tx1"/>
+                </a:solidFill>
+                <a:latin typeface="+mn-lt"/>
+                <a:ea typeface="+mn-ea"/>
+                <a:cs typeface="+mn-cs"/>
+              </a:defRPr>
+            </a:lvl1pPr>
+            <a:lvl2pPr marL="457200" indent="0" algn="ctr" defTabSz="914400" rtl="0" eaLnBrk="1" latinLnBrk="0" hangingPunct="1">
+              <a:lnSpc>
+                <a:spcPct val="90000"/>
+              </a:lnSpc>
+              <a:spcBef>
+                <a:spcPts val="500"/>
+              </a:spcBef>
+              <a:buFont typeface="Arial"/>
+              <a:buNone/>
+              <a:defRPr sz="2000" kern="1200">
+                <a:solidFill>
+                  <a:schemeClr val="tx1"/>
+                </a:solidFill>
+                <a:latin typeface="+mn-lt"/>
+                <a:ea typeface="+mn-ea"/>
+                <a:cs typeface="+mn-cs"/>
+              </a:defRPr>
+            </a:lvl2pPr>
+            <a:lvl3pPr marL="914400" indent="0" algn="ctr" defTabSz="914400" rtl="0" eaLnBrk="1" latinLnBrk="0" hangingPunct="1">
+              <a:lnSpc>
+                <a:spcPct val="90000"/>
+              </a:lnSpc>
+              <a:spcBef>
+                <a:spcPts val="500"/>
+              </a:spcBef>
+              <a:buFont typeface="Arial"/>
+              <a:buNone/>
+              <a:defRPr sz="1800" kern="1200">
+                <a:solidFill>
+                  <a:schemeClr val="tx1"/>
+                </a:solidFill>
+                <a:latin typeface="+mn-lt"/>
+                <a:ea typeface="+mn-ea"/>
+                <a:cs typeface="+mn-cs"/>
+              </a:defRPr>
+            </a:lvl3pPr>
+            <a:lvl4pPr marL="1371600" indent="0" algn="ctr" defTabSz="914400" rtl="0" eaLnBrk="1" latinLnBrk="0" hangingPunct="1">
+              <a:lnSpc>
+                <a:spcPct val="90000"/>
+              </a:lnSpc>
+              <a:spcBef>
+                <a:spcPts val="500"/>
+              </a:spcBef>
+              <a:buFont typeface="Arial"/>
+              <a:buNone/>
+              <a:defRPr sz="1600" kern="1200">
+                <a:solidFill>
+                  <a:schemeClr val="tx1"/>
+                </a:solidFill>
+                <a:latin typeface="+mn-lt"/>
+                <a:ea typeface="+mn-ea"/>
+                <a:cs typeface="+mn-cs"/>
+              </a:defRPr>
+            </a:lvl4pPr>
+            <a:lvl5pPr marL="1828800" indent="0" algn="ctr" defTabSz="914400" rtl="0" eaLnBrk="1" latinLnBrk="0" hangingPunct="1">
+              <a:lnSpc>
+                <a:spcPct val="90000"/>
+              </a:lnSpc>
+              <a:spcBef>
+                <a:spcPts val="500"/>
+              </a:spcBef>
+              <a:buFont typeface="Arial"/>
+              <a:buNone/>
+              <a:defRPr sz="1600" kern="1200">
+                <a:solidFill>
+                  <a:schemeClr val="tx1"/>
+                </a:solidFill>
+                <a:latin typeface="+mn-lt"/>
+                <a:ea typeface="+mn-ea"/>
+                <a:cs typeface="+mn-cs"/>
+              </a:defRPr>
+            </a:lvl5pPr>
+            <a:lvl6pPr marL="2286000" indent="0" algn="ctr" defTabSz="914400" rtl="0" eaLnBrk="1" latinLnBrk="0" hangingPunct="1">
+              <a:lnSpc>
+                <a:spcPct val="90000"/>
+              </a:lnSpc>
+              <a:spcBef>
+                <a:spcPts val="500"/>
+              </a:spcBef>
+              <a:buFont typeface="Arial"/>
+              <a:buNone/>
+              <a:defRPr sz="1600" kern="1200">
+                <a:solidFill>
+                  <a:schemeClr val="tx1"/>
+                </a:solidFill>
+                <a:latin typeface="+mn-lt"/>
+                <a:ea typeface="+mn-ea"/>
+                <a:cs typeface="+mn-cs"/>
+              </a:defRPr>
+            </a:lvl6pPr>
+            <a:lvl7pPr marL="2743200" indent="0" algn="ctr" defTabSz="914400" rtl="0" eaLnBrk="1" latinLnBrk="0" hangingPunct="1">
+              <a:lnSpc>
+                <a:spcPct val="90000"/>
+              </a:lnSpc>
+              <a:spcBef>
+                <a:spcPts val="500"/>
+              </a:spcBef>
+              <a:buFont typeface="Arial"/>
+              <a:buNone/>
+              <a:defRPr sz="1600" kern="1200">
+                <a:solidFill>
+                  <a:schemeClr val="tx1"/>
+                </a:solidFill>
+                <a:latin typeface="+mn-lt"/>
+                <a:ea typeface="+mn-ea"/>
+                <a:cs typeface="+mn-cs"/>
+              </a:defRPr>
+            </a:lvl7pPr>
+            <a:lvl8pPr marL="3200400" indent="0" algn="ctr" defTabSz="914400" rtl="0" eaLnBrk="1" latinLnBrk="0" hangingPunct="1">
+              <a:lnSpc>
+                <a:spcPct val="90000"/>
+              </a:lnSpc>
+              <a:spcBef>
+                <a:spcPts val="500"/>
+              </a:spcBef>
+              <a:buFont typeface="Arial"/>
+              <a:buNone/>
+              <a:defRPr sz="1600" kern="1200">
+                <a:solidFill>
+                  <a:schemeClr val="tx1"/>
+                </a:solidFill>
+                <a:latin typeface="+mn-lt"/>
+                <a:ea typeface="+mn-ea"/>
+                <a:cs typeface="+mn-cs"/>
+              </a:defRPr>
+            </a:lvl8pPr>
+            <a:lvl9pPr marL="3657600" indent="0" algn="ctr" defTabSz="914400" rtl="0" eaLnBrk="1" latinLnBrk="0" hangingPunct="1">
+              <a:lnSpc>
+                <a:spcPct val="90000"/>
+              </a:lnSpc>
+              <a:spcBef>
+                <a:spcPts val="500"/>
+              </a:spcBef>
+              <a:buFont typeface="Arial"/>
+              <a:buNone/>
+              <a:defRPr sz="1600" kern="1200">
+                <a:solidFill>
+                  <a:schemeClr val="tx1"/>
+                </a:solidFill>
+                <a:latin typeface="+mn-lt"/>
+                <a:ea typeface="+mn-ea"/>
+                <a:cs typeface="+mn-cs"/>
+              </a:defRPr>
+            </a:lvl9pPr>
+          </a:lstStyle>
+          <a:p>
+            <a:r>
+              <a:rPr lang="en-US" sz="1400">
+                <a:latin typeface="Arial" charset="0"/>
+                <a:ea typeface="Arial" charset="0"/>
+                <a:cs typeface="Arial" charset="0"/>
+              </a:rPr>
+              <a:t>product releases last year</a:t>
+            </a:r>
+          </a:p>
+        </p:txBody>
+      </p:sp>
+      <p:sp>
+        <p:nvSpPr>
+          <p:cNvPr id="25" name="Subtitle 2">
+            <a:extLst>
+              <a:ext uri="{FF2B5EF4-FFF2-40B4-BE49-F238E27FC236}">
+                <a16:creationId xmlns:a16="http://schemas.microsoft.com/office/drawing/2014/main" id="{86300543-E611-432B-B579-10D9BD512812}"/>
+              </a:ext>
+            </a:extLst>
+          </p:cNvPr>
+          <p:cNvSpPr txBox="1">
+            <a:spLocks/>
+          </p:cNvSpPr>
+          <p:nvPr/>
+        </p:nvSpPr>
+        <p:spPr>
+          <a:xfrm>
+            <a:off x="9162152" y="4781912"/>
+            <a:ext cx="1358685" cy="481765"/>
+          </a:xfrm>
+          <a:prstGeom prst="rect">
+            <a:avLst/>
+          </a:prstGeom>
+        </p:spPr>
+        <p:txBody>
+          <a:bodyPr vert="horz" lIns="91440" tIns="45720" rIns="91440" bIns="45720" rtlCol="0">
+            <a:noAutofit/>
+          </a:bodyPr>
+          <a:lstStyle>
+            <a:lvl1pPr marL="0" indent="0" algn="ctr" defTabSz="914400" rtl="0" eaLnBrk="1" latinLnBrk="0" hangingPunct="1">
+              <a:lnSpc>
+                <a:spcPct val="90000"/>
+              </a:lnSpc>
+              <a:spcBef>
+                <a:spcPts val="1000"/>
+              </a:spcBef>
+              <a:buFont typeface="Arial"/>
+              <a:buNone/>
+              <a:defRPr sz="2400" kern="1200">
+                <a:solidFill>
+                  <a:schemeClr val="tx1"/>
+                </a:solidFill>
+                <a:latin typeface="+mn-lt"/>
+                <a:ea typeface="+mn-ea"/>
+                <a:cs typeface="+mn-cs"/>
+              </a:defRPr>
+            </a:lvl1pPr>
+            <a:lvl2pPr marL="457200" indent="0" algn="ctr" defTabSz="914400" rtl="0" eaLnBrk="1" latinLnBrk="0" hangingPunct="1">
+              <a:lnSpc>
+                <a:spcPct val="90000"/>
+              </a:lnSpc>
+              <a:spcBef>
+                <a:spcPts val="500"/>
+              </a:spcBef>
+              <a:buFont typeface="Arial"/>
+              <a:buNone/>
+              <a:defRPr sz="2000" kern="1200">
+                <a:solidFill>
+                  <a:schemeClr val="tx1"/>
+                </a:solidFill>
+                <a:latin typeface="+mn-lt"/>
+                <a:ea typeface="+mn-ea"/>
+                <a:cs typeface="+mn-cs"/>
+              </a:defRPr>
+            </a:lvl2pPr>
+            <a:lvl3pPr marL="914400" indent="0" algn="ctr" defTabSz="914400" rtl="0" eaLnBrk="1" latinLnBrk="0" hangingPunct="1">
+              <a:lnSpc>
+                <a:spcPct val="90000"/>
+              </a:lnSpc>
+              <a:spcBef>
+                <a:spcPts val="500"/>
+              </a:spcBef>
+              <a:buFont typeface="Arial"/>
+              <a:buNone/>
+              <a:defRPr sz="1800" kern="1200">
+                <a:solidFill>
+                  <a:schemeClr val="tx1"/>
+                </a:solidFill>
+                <a:latin typeface="+mn-lt"/>
+                <a:ea typeface="+mn-ea"/>
+                <a:cs typeface="+mn-cs"/>
+              </a:defRPr>
+            </a:lvl3pPr>
+            <a:lvl4pPr marL="1371600" indent="0" algn="ctr" defTabSz="914400" rtl="0" eaLnBrk="1" latinLnBrk="0" hangingPunct="1">
+              <a:lnSpc>
+                <a:spcPct val="90000"/>
+              </a:lnSpc>
+              <a:spcBef>
+                <a:spcPts val="500"/>
+              </a:spcBef>
+              <a:buFont typeface="Arial"/>
+              <a:buNone/>
+              <a:defRPr sz="1600" kern="1200">
+                <a:solidFill>
+                  <a:schemeClr val="tx1"/>
+                </a:solidFill>
+                <a:latin typeface="+mn-lt"/>
+                <a:ea typeface="+mn-ea"/>
+                <a:cs typeface="+mn-cs"/>
+              </a:defRPr>
+            </a:lvl4pPr>
+            <a:lvl5pPr marL="1828800" indent="0" algn="ctr" defTabSz="914400" rtl="0" eaLnBrk="1" latinLnBrk="0" hangingPunct="1">
+              <a:lnSpc>
+                <a:spcPct val="90000"/>
+              </a:lnSpc>
+              <a:spcBef>
+                <a:spcPts val="500"/>
+              </a:spcBef>
+              <a:buFont typeface="Arial"/>
+              <a:buNone/>
+              <a:defRPr sz="1600" kern="1200">
+                <a:solidFill>
+                  <a:schemeClr val="tx1"/>
+                </a:solidFill>
+                <a:latin typeface="+mn-lt"/>
+                <a:ea typeface="+mn-ea"/>
+                <a:cs typeface="+mn-cs"/>
+              </a:defRPr>
+            </a:lvl5pPr>
+            <a:lvl6pPr marL="2286000" indent="0" algn="ctr" defTabSz="914400" rtl="0" eaLnBrk="1" latinLnBrk="0" hangingPunct="1">
+              <a:lnSpc>
+                <a:spcPct val="90000"/>
+              </a:lnSpc>
+              <a:spcBef>
+                <a:spcPts val="500"/>
+              </a:spcBef>
+              <a:buFont typeface="Arial"/>
+              <a:buNone/>
+              <a:defRPr sz="1600" kern="1200">
+                <a:solidFill>
+                  <a:schemeClr val="tx1"/>
+                </a:solidFill>
+                <a:latin typeface="+mn-lt"/>
+                <a:ea typeface="+mn-ea"/>
+                <a:cs typeface="+mn-cs"/>
+              </a:defRPr>
+            </a:lvl6pPr>
+            <a:lvl7pPr marL="2743200" indent="0" algn="ctr" defTabSz="914400" rtl="0" eaLnBrk="1" latinLnBrk="0" hangingPunct="1">
+              <a:lnSpc>
+                <a:spcPct val="90000"/>
+              </a:lnSpc>
+              <a:spcBef>
+                <a:spcPts val="500"/>
+              </a:spcBef>
+              <a:buFont typeface="Arial"/>
+              <a:buNone/>
+              <a:defRPr sz="1600" kern="1200">
+                <a:solidFill>
+                  <a:schemeClr val="tx1"/>
+                </a:solidFill>
+                <a:latin typeface="+mn-lt"/>
+                <a:ea typeface="+mn-ea"/>
+                <a:cs typeface="+mn-cs"/>
+              </a:defRPr>
+            </a:lvl7pPr>
+            <a:lvl8pPr marL="3200400" indent="0" algn="ctr" defTabSz="914400" rtl="0" eaLnBrk="1" latinLnBrk="0" hangingPunct="1">
+              <a:lnSpc>
+                <a:spcPct val="90000"/>
+              </a:lnSpc>
+              <a:spcBef>
+                <a:spcPts val="500"/>
+              </a:spcBef>
+              <a:buFont typeface="Arial"/>
+              <a:buNone/>
+              <a:defRPr sz="1600" kern="1200">
+                <a:solidFill>
+                  <a:schemeClr val="tx1"/>
+                </a:solidFill>
+                <a:latin typeface="+mn-lt"/>
+                <a:ea typeface="+mn-ea"/>
+                <a:cs typeface="+mn-cs"/>
+              </a:defRPr>
+            </a:lvl8pPr>
+            <a:lvl9pPr marL="3657600" indent="0" algn="ctr" defTabSz="914400" rtl="0" eaLnBrk="1" latinLnBrk="0" hangingPunct="1">
+              <a:lnSpc>
+                <a:spcPct val="90000"/>
+              </a:lnSpc>
+              <a:spcBef>
+                <a:spcPts val="500"/>
+              </a:spcBef>
+              <a:buFont typeface="Arial"/>
+              <a:buNone/>
+              <a:defRPr sz="1600" kern="1200">
+                <a:solidFill>
+                  <a:schemeClr val="tx1"/>
+                </a:solidFill>
+                <a:latin typeface="+mn-lt"/>
+                <a:ea typeface="+mn-ea"/>
+                <a:cs typeface="+mn-cs"/>
+              </a:defRPr>
+            </a:lvl9pPr>
+          </a:lstStyle>
+          <a:p>
+            <a:r>
+              <a:rPr lang="en-US" sz="3600" b="1" dirty="0">
+                <a:solidFill>
+                  <a:srgbClr val="CC0000"/>
+                </a:solidFill>
+                <a:latin typeface="Arial" charset="0"/>
+                <a:ea typeface="Arial" charset="0"/>
+                <a:cs typeface="Arial" charset="0"/>
+              </a:rPr>
+              <a:t>70</a:t>
+            </a:r>
+          </a:p>
+        </p:txBody>
+      </p:sp>
+      <p:sp>
+        <p:nvSpPr>
+          <p:cNvPr id="26" name="Subtitle 2">
+            <a:extLst>
+              <a:ext uri="{FF2B5EF4-FFF2-40B4-BE49-F238E27FC236}">
+                <a16:creationId xmlns:a16="http://schemas.microsoft.com/office/drawing/2014/main" id="{34BC14E3-5927-49C2-A625-AF2AB2D16849}"/>
+              </a:ext>
+            </a:extLst>
+          </p:cNvPr>
+          <p:cNvSpPr txBox="1">
+            <a:spLocks/>
+          </p:cNvSpPr>
+          <p:nvPr/>
+        </p:nvSpPr>
+        <p:spPr>
+          <a:xfrm>
+            <a:off x="8790513" y="5313916"/>
+            <a:ext cx="2147095" cy="562965"/>
+          </a:xfrm>
+          <a:prstGeom prst="rect">
+            <a:avLst/>
+          </a:prstGeom>
+        </p:spPr>
+        <p:txBody>
+          <a:bodyPr vert="horz" lIns="91440" tIns="45720" rIns="91440" bIns="45720" rtlCol="0">
+            <a:normAutofit/>
+          </a:bodyPr>
+          <a:lstStyle>
+            <a:lvl1pPr marL="0" indent="0" algn="ctr" defTabSz="914400" rtl="0" eaLnBrk="1" latinLnBrk="0" hangingPunct="1">
+              <a:lnSpc>
+                <a:spcPct val="90000"/>
+              </a:lnSpc>
+              <a:spcBef>
+                <a:spcPts val="1000"/>
+              </a:spcBef>
+              <a:buFont typeface="Arial"/>
+              <a:buNone/>
+              <a:defRPr sz="2400" kern="1200">
+                <a:solidFill>
+                  <a:schemeClr val="tx1"/>
+                </a:solidFill>
+                <a:latin typeface="+mn-lt"/>
+                <a:ea typeface="+mn-ea"/>
+                <a:cs typeface="+mn-cs"/>
+              </a:defRPr>
+            </a:lvl1pPr>
+            <a:lvl2pPr marL="457200" indent="0" algn="ctr" defTabSz="914400" rtl="0" eaLnBrk="1" latinLnBrk="0" hangingPunct="1">
+              <a:lnSpc>
+                <a:spcPct val="90000"/>
+              </a:lnSpc>
+              <a:spcBef>
+                <a:spcPts val="500"/>
+              </a:spcBef>
+              <a:buFont typeface="Arial"/>
+              <a:buNone/>
+              <a:defRPr sz="2000" kern="1200">
+                <a:solidFill>
+                  <a:schemeClr val="tx1"/>
+                </a:solidFill>
+                <a:latin typeface="+mn-lt"/>
+                <a:ea typeface="+mn-ea"/>
+                <a:cs typeface="+mn-cs"/>
+              </a:defRPr>
+            </a:lvl2pPr>
+            <a:lvl3pPr marL="914400" indent="0" algn="ctr" defTabSz="914400" rtl="0" eaLnBrk="1" latinLnBrk="0" hangingPunct="1">
+              <a:lnSpc>
+                <a:spcPct val="90000"/>
+              </a:lnSpc>
+              <a:spcBef>
+                <a:spcPts val="500"/>
+              </a:spcBef>
+              <a:buFont typeface="Arial"/>
+              <a:buNone/>
+              <a:defRPr sz="1800" kern="1200">
+                <a:solidFill>
+                  <a:schemeClr val="tx1"/>
+                </a:solidFill>
+                <a:latin typeface="+mn-lt"/>
+                <a:ea typeface="+mn-ea"/>
+                <a:cs typeface="+mn-cs"/>
+              </a:defRPr>
+            </a:lvl3pPr>
+            <a:lvl4pPr marL="1371600" indent="0" algn="ctr" defTabSz="914400" rtl="0" eaLnBrk="1" latinLnBrk="0" hangingPunct="1">
+              <a:lnSpc>
+                <a:spcPct val="90000"/>
+              </a:lnSpc>
+              <a:spcBef>
+                <a:spcPts val="500"/>
+              </a:spcBef>
+              <a:buFont typeface="Arial"/>
+              <a:buNone/>
+              <a:defRPr sz="1600" kern="1200">
+                <a:solidFill>
+                  <a:schemeClr val="tx1"/>
+                </a:solidFill>
+                <a:latin typeface="+mn-lt"/>
+                <a:ea typeface="+mn-ea"/>
+                <a:cs typeface="+mn-cs"/>
+              </a:defRPr>
+            </a:lvl4pPr>
+            <a:lvl5pPr marL="1828800" indent="0" algn="ctr" defTabSz="914400" rtl="0" eaLnBrk="1" latinLnBrk="0" hangingPunct="1">
+              <a:lnSpc>
+                <a:spcPct val="90000"/>
+              </a:lnSpc>
+              <a:spcBef>
+                <a:spcPts val="500"/>
+              </a:spcBef>
+              <a:buFont typeface="Arial"/>
+              <a:buNone/>
+              <a:defRPr sz="1600" kern="1200">
+                <a:solidFill>
+                  <a:schemeClr val="tx1"/>
+                </a:solidFill>
+                <a:latin typeface="+mn-lt"/>
+                <a:ea typeface="+mn-ea"/>
+                <a:cs typeface="+mn-cs"/>
+              </a:defRPr>
+            </a:lvl5pPr>
+            <a:lvl6pPr marL="2286000" indent="0" algn="ctr" defTabSz="914400" rtl="0" eaLnBrk="1" latinLnBrk="0" hangingPunct="1">
+              <a:lnSpc>
+                <a:spcPct val="90000"/>
+              </a:lnSpc>
+              <a:spcBef>
+                <a:spcPts val="500"/>
+              </a:spcBef>
+              <a:buFont typeface="Arial"/>
+              <a:buNone/>
+              <a:defRPr sz="1600" kern="1200">
+                <a:solidFill>
+                  <a:schemeClr val="tx1"/>
+                </a:solidFill>
+                <a:latin typeface="+mn-lt"/>
+                <a:ea typeface="+mn-ea"/>
+                <a:cs typeface="+mn-cs"/>
+              </a:defRPr>
+            </a:lvl6pPr>
+            <a:lvl7pPr marL="2743200" indent="0" algn="ctr" defTabSz="914400" rtl="0" eaLnBrk="1" latinLnBrk="0" hangingPunct="1">
+              <a:lnSpc>
+                <a:spcPct val="90000"/>
+              </a:lnSpc>
+              <a:spcBef>
+                <a:spcPts val="500"/>
+              </a:spcBef>
+              <a:buFont typeface="Arial"/>
+              <a:buNone/>
+              <a:defRPr sz="1600" kern="1200">
+                <a:solidFill>
+                  <a:schemeClr val="tx1"/>
+                </a:solidFill>
+                <a:latin typeface="+mn-lt"/>
+                <a:ea typeface="+mn-ea"/>
+                <a:cs typeface="+mn-cs"/>
+              </a:defRPr>
+            </a:lvl7pPr>
+            <a:lvl8pPr marL="3200400" indent="0" algn="ctr" defTabSz="914400" rtl="0" eaLnBrk="1" latinLnBrk="0" hangingPunct="1">
+              <a:lnSpc>
+                <a:spcPct val="90000"/>
+              </a:lnSpc>
+              <a:spcBef>
+                <a:spcPts val="500"/>
+              </a:spcBef>
+              <a:buFont typeface="Arial"/>
+              <a:buNone/>
+              <a:defRPr sz="1600" kern="1200">
+                <a:solidFill>
+                  <a:schemeClr val="tx1"/>
+                </a:solidFill>
+                <a:latin typeface="+mn-lt"/>
+                <a:ea typeface="+mn-ea"/>
+                <a:cs typeface="+mn-cs"/>
+              </a:defRPr>
+            </a:lvl8pPr>
+            <a:lvl9pPr marL="3657600" indent="0" algn="ctr" defTabSz="914400" rtl="0" eaLnBrk="1" latinLnBrk="0" hangingPunct="1">
+              <a:lnSpc>
+                <a:spcPct val="90000"/>
+              </a:lnSpc>
+              <a:spcBef>
+                <a:spcPts val="500"/>
+              </a:spcBef>
+              <a:buFont typeface="Arial"/>
+              <a:buNone/>
+              <a:defRPr sz="1600" kern="1200">
+                <a:solidFill>
+                  <a:schemeClr val="tx1"/>
+                </a:solidFill>
+                <a:latin typeface="+mn-lt"/>
+                <a:ea typeface="+mn-ea"/>
+                <a:cs typeface="+mn-cs"/>
+              </a:defRPr>
+            </a:lvl9pPr>
+          </a:lstStyle>
+          <a:p>
+            <a:r>
+              <a:rPr lang="en-US" sz="1400" dirty="0">
+                <a:latin typeface="Arial" charset="0"/>
+                <a:ea typeface="Arial" charset="0"/>
+                <a:cs typeface="Arial" charset="0"/>
+              </a:rPr>
+              <a:t>User Groups sponsored</a:t>
+            </a:r>
+          </a:p>
+        </p:txBody>
+      </p:sp>
+      <p:sp>
+        <p:nvSpPr>
+          <p:cNvPr id="31" name="Title 1">
+            <a:extLst>
+              <a:ext uri="{FF2B5EF4-FFF2-40B4-BE49-F238E27FC236}">
+                <a16:creationId xmlns:a16="http://schemas.microsoft.com/office/drawing/2014/main" id="{3591ECC5-F41B-46F9-AB52-8960B2CF47CD}"/>
+              </a:ext>
+            </a:extLst>
+          </p:cNvPr>
+          <p:cNvSpPr>
+            <a:spLocks noGrp="1"/>
+          </p:cNvSpPr>
+          <p:nvPr>
+            <p:ph type="title"/>
+          </p:nvPr>
+        </p:nvSpPr>
+        <p:spPr>
+          <a:xfrm>
+            <a:off x="422008" y="193493"/>
+            <a:ext cx="10515600" cy="765041"/>
+          </a:xfrm>
+        </p:spPr>
+        <p:txBody>
+          <a:bodyPr>
+            <a:normAutofit/>
+          </a:bodyPr>
+          <a:lstStyle/>
+          <a:p>
+            <a:r>
+              <a:rPr lang="en-GB" sz="3200" b="1" dirty="0">
+                <a:latin typeface="Roboto" pitchFamily="2" charset="0"/>
+                <a:ea typeface="Roboto" pitchFamily="2" charset="0"/>
+              </a:rPr>
+              <a:t>About Redgate</a:t>
+            </a:r>
+          </a:p>
+        </p:txBody>
+      </p:sp>
+      <p:pic>
+        <p:nvPicPr>
+          <p:cNvPr id="2" name="Picture 1"/>
+          <p:cNvPicPr>
+            <a:picLocks noChangeAspect="1"/>
+          </p:cNvPicPr>
+          <p:nvPr/>
+        </p:nvPicPr>
+        <p:blipFill>
+          <a:blip r:embed="rId3"/>
+          <a:stretch>
+            <a:fillRect/>
+          </a:stretch>
+        </p:blipFill>
+        <p:spPr>
+          <a:xfrm>
+            <a:off x="1990557" y="1139519"/>
+            <a:ext cx="814324" cy="1105916"/>
+          </a:xfrm>
+          <a:prstGeom prst="rect">
+            <a:avLst/>
+          </a:prstGeom>
+        </p:spPr>
+      </p:pic>
+      <p:pic>
+        <p:nvPicPr>
+          <p:cNvPr id="3" name="Picture 2"/>
+          <p:cNvPicPr>
+            <a:picLocks noChangeAspect="1"/>
+          </p:cNvPicPr>
+          <p:nvPr/>
+        </p:nvPicPr>
+        <p:blipFill>
+          <a:blip r:embed="rId4"/>
+          <a:stretch>
+            <a:fillRect/>
+          </a:stretch>
+        </p:blipFill>
+        <p:spPr>
+          <a:xfrm>
+            <a:off x="4363598" y="1224863"/>
+            <a:ext cx="935228" cy="1020572"/>
+          </a:xfrm>
+          <a:prstGeom prst="rect">
+            <a:avLst/>
+          </a:prstGeom>
+        </p:spPr>
+      </p:pic>
+      <p:pic>
+        <p:nvPicPr>
+          <p:cNvPr id="28" name="Picture 27"/>
+          <p:cNvPicPr>
+            <a:picLocks noChangeAspect="1"/>
+          </p:cNvPicPr>
+          <p:nvPr/>
+        </p:nvPicPr>
+        <p:blipFill>
+          <a:blip r:embed="rId5"/>
+          <a:stretch>
+            <a:fillRect/>
+          </a:stretch>
+        </p:blipFill>
+        <p:spPr>
+          <a:xfrm>
+            <a:off x="6770949" y="1209604"/>
+            <a:ext cx="1130808" cy="995680"/>
+          </a:xfrm>
+          <a:prstGeom prst="rect">
+            <a:avLst/>
+          </a:prstGeom>
+        </p:spPr>
+      </p:pic>
+      <p:pic>
+        <p:nvPicPr>
+          <p:cNvPr id="29" name="Picture 28"/>
+          <p:cNvPicPr>
+            <a:picLocks noChangeAspect="1"/>
+          </p:cNvPicPr>
+          <p:nvPr/>
+        </p:nvPicPr>
+        <p:blipFill>
+          <a:blip r:embed="rId6"/>
+          <a:stretch>
+            <a:fillRect/>
+          </a:stretch>
+        </p:blipFill>
+        <p:spPr>
+          <a:xfrm>
+            <a:off x="9319992" y="1255975"/>
+            <a:ext cx="1088136" cy="928116"/>
+          </a:xfrm>
+          <a:prstGeom prst="rect">
+            <a:avLst/>
+          </a:prstGeom>
+        </p:spPr>
+      </p:pic>
+      <p:pic>
+        <p:nvPicPr>
+          <p:cNvPr id="30" name="Picture 29"/>
+          <p:cNvPicPr>
+            <a:picLocks noChangeAspect="1"/>
+          </p:cNvPicPr>
+          <p:nvPr/>
+        </p:nvPicPr>
+        <p:blipFill>
+          <a:blip r:embed="rId7"/>
+          <a:stretch>
+            <a:fillRect/>
+          </a:stretch>
+        </p:blipFill>
+        <p:spPr>
+          <a:xfrm>
+            <a:off x="1912325" y="3570006"/>
+            <a:ext cx="892556" cy="1123696"/>
+          </a:xfrm>
+          <a:prstGeom prst="rect">
+            <a:avLst/>
+          </a:prstGeom>
+        </p:spPr>
+      </p:pic>
+      <p:pic>
+        <p:nvPicPr>
+          <p:cNvPr id="32" name="Picture 31"/>
+          <p:cNvPicPr>
+            <a:picLocks noChangeAspect="1"/>
+          </p:cNvPicPr>
+          <p:nvPr/>
+        </p:nvPicPr>
+        <p:blipFill>
+          <a:blip r:embed="rId8"/>
+          <a:stretch>
+            <a:fillRect/>
+          </a:stretch>
+        </p:blipFill>
+        <p:spPr>
+          <a:xfrm>
+            <a:off x="4228797" y="3627393"/>
+            <a:ext cx="1248156" cy="1063244"/>
+          </a:xfrm>
+          <a:prstGeom prst="rect">
+            <a:avLst/>
+          </a:prstGeom>
+        </p:spPr>
+      </p:pic>
+      <p:pic>
+        <p:nvPicPr>
+          <p:cNvPr id="33" name="Picture 32"/>
+          <p:cNvPicPr>
+            <a:picLocks noChangeAspect="1"/>
+          </p:cNvPicPr>
+          <p:nvPr/>
+        </p:nvPicPr>
+        <p:blipFill>
+          <a:blip r:embed="rId9"/>
+          <a:stretch>
+            <a:fillRect/>
+          </a:stretch>
+        </p:blipFill>
+        <p:spPr>
+          <a:xfrm>
+            <a:off x="6940288" y="3485390"/>
+            <a:ext cx="903224" cy="1166368"/>
+          </a:xfrm>
+          <a:prstGeom prst="rect">
+            <a:avLst/>
+          </a:prstGeom>
+        </p:spPr>
+      </p:pic>
+      <p:pic>
+        <p:nvPicPr>
+          <p:cNvPr id="34" name="Picture 33"/>
+          <p:cNvPicPr>
+            <a:picLocks noChangeAspect="1"/>
+          </p:cNvPicPr>
+          <p:nvPr/>
+        </p:nvPicPr>
+        <p:blipFill>
+          <a:blip r:embed="rId10"/>
+          <a:stretch>
+            <a:fillRect/>
+          </a:stretch>
+        </p:blipFill>
+        <p:spPr>
+          <a:xfrm>
+            <a:off x="9415937" y="3594318"/>
+            <a:ext cx="1155700" cy="1127252"/>
+          </a:xfrm>
+          <a:prstGeom prst="rect">
+            <a:avLst/>
+          </a:prstGeom>
+        </p:spPr>
+      </p:pic>
+    </p:spTree>
+    <p:extLst>
+      <p:ext uri="{BB962C8B-B14F-4D97-AF65-F5344CB8AC3E}">
+        <p14:creationId xmlns:p14="http://schemas.microsoft.com/office/powerpoint/2010/main" val="3495456256"/>
       </p:ext>
     </p:extLst>
   </p:cSld>
@@ -2885,7 +6564,7 @@
   <a:extraClrSchemeLst/>
   <a:extLst>
     <a:ext uri="{05A4C25C-085E-4340-85A3-A5531E510DB2}">
-      <thm15:themeFamily xmlns="" xmlns:thm15="http://schemas.microsoft.com/office/thememl/2012/main" name="Office Theme" id="{62F939B6-93AF-4DB8-9C6B-D6C7DFDC589F}" vid="{4A3C46E8-61CC-4603-A589-7422A47A8E4A}"/>
+      <thm15:themeFamily xmlns:thm15="http://schemas.microsoft.com/office/thememl/2012/main" name="Office Theme" id="{62F939B6-93AF-4DB8-9C6B-D6C7DFDC589F}" vid="{4A3C46E8-61CC-4603-A589-7422A47A8E4A}"/>
     </a:ext>
   </a:extLst>
 </a:theme>
@@ -3146,7 +6825,7 @@
   <a:extraClrSchemeLst/>
   <a:extLst>
     <a:ext uri="{05A4C25C-085E-4340-85A3-A5531E510DB2}">
-      <thm15:themeFamily xmlns="" xmlns:thm15="http://schemas.microsoft.com/office/thememl/2012/main" name="Office Theme" id="{62F939B6-93AF-4DB8-9C6B-D6C7DFDC589F}" vid="{4A3C46E8-61CC-4603-A589-7422A47A8E4A}"/>
+      <thm15:themeFamily xmlns:thm15="http://schemas.microsoft.com/office/thememl/2012/main" name="Office Theme" id="{62F939B6-93AF-4DB8-9C6B-D6C7DFDC589F}" vid="{4A3C46E8-61CC-4603-A589-7422A47A8E4A}"/>
     </a:ext>
   </a:extLst>
 </a:theme>

</xml_diff>